<commit_message>
Oleksiy updated slide deck with new ideas
</commit_message>
<xml_diff>
--- a/Presentation/The REAL Moneyball.pptx
+++ b/Presentation/The REAL Moneyball.pptx
@@ -5,7 +5,7 @@
     <p:sldMasterId id="2147483648" r:id="rId1"/>
   </p:sldMasterIdLst>
   <p:notesMasterIdLst>
-    <p:notesMasterId r:id="rId21"/>
+    <p:notesMasterId r:id="rId23"/>
   </p:notesMasterIdLst>
   <p:sldIdLst>
     <p:sldId id="256" r:id="rId2"/>
@@ -13,37 +13,39 @@
     <p:sldId id="313" r:id="rId4"/>
     <p:sldId id="316" r:id="rId5"/>
     <p:sldId id="322" r:id="rId6"/>
-    <p:sldId id="317" r:id="rId7"/>
-    <p:sldId id="318" r:id="rId8"/>
-    <p:sldId id="315" r:id="rId9"/>
-    <p:sldId id="319" r:id="rId10"/>
-    <p:sldId id="320" r:id="rId11"/>
-    <p:sldId id="321" r:id="rId12"/>
-    <p:sldId id="323" r:id="rId13"/>
-    <p:sldId id="324" r:id="rId14"/>
-    <p:sldId id="326" r:id="rId15"/>
-    <p:sldId id="325" r:id="rId16"/>
-    <p:sldId id="327" r:id="rId17"/>
-    <p:sldId id="328" r:id="rId18"/>
-    <p:sldId id="296" r:id="rId19"/>
-    <p:sldId id="295" r:id="rId20"/>
+    <p:sldId id="329" r:id="rId7"/>
+    <p:sldId id="317" r:id="rId8"/>
+    <p:sldId id="318" r:id="rId9"/>
+    <p:sldId id="315" r:id="rId10"/>
+    <p:sldId id="319" r:id="rId11"/>
+    <p:sldId id="320" r:id="rId12"/>
+    <p:sldId id="321" r:id="rId13"/>
+    <p:sldId id="323" r:id="rId14"/>
+    <p:sldId id="324" r:id="rId15"/>
+    <p:sldId id="326" r:id="rId16"/>
+    <p:sldId id="330" r:id="rId17"/>
+    <p:sldId id="325" r:id="rId18"/>
+    <p:sldId id="327" r:id="rId19"/>
+    <p:sldId id="328" r:id="rId20"/>
+    <p:sldId id="296" r:id="rId21"/>
+    <p:sldId id="295" r:id="rId22"/>
   </p:sldIdLst>
   <p:sldSz cx="12192000" cy="6858000"/>
   <p:notesSz cx="6858000" cy="9144000"/>
   <p:embeddedFontLst>
     <p:embeddedFont>
       <p:font typeface="Calibri" panose="020F0502020204030204" pitchFamily="34" charset="0"/>
-      <p:regular r:id="rId22"/>
-      <p:bold r:id="rId23"/>
-      <p:italic r:id="rId24"/>
-      <p:boldItalic r:id="rId25"/>
+      <p:regular r:id="rId24"/>
+      <p:bold r:id="rId25"/>
+      <p:italic r:id="rId26"/>
+      <p:boldItalic r:id="rId27"/>
     </p:embeddedFont>
     <p:embeddedFont>
       <p:font typeface="Garamond" panose="02020404030301010803" pitchFamily="18" charset="0"/>
-      <p:regular r:id="rId26"/>
-      <p:bold r:id="rId27"/>
-      <p:italic r:id="rId28"/>
-      <p:boldItalic r:id="rId29"/>
+      <p:regular r:id="rId28"/>
+      <p:bold r:id="rId29"/>
+      <p:italic r:id="rId30"/>
+      <p:boldItalic r:id="rId31"/>
     </p:embeddedFont>
   </p:embeddedFontLst>
   <p:defaultTextStyle>
@@ -280,7 +282,7 @@
       <p15:sldGuideLst xmlns:p15="http://schemas.microsoft.com/office/powerpoint/2012/main"/>
     </p:ext>
     <p:ext uri="http://customooxmlschemas.google.com/">
-      <go:slidesCustomData xmlns="" xmlns:mc="http://schemas.openxmlformats.org/markup-compatibility/2006" xmlns:mv="urn:schemas-microsoft-com:mac:vml" xmlns:c="http://schemas.openxmlformats.org/drawingml/2006/chart" xmlns:dgm="http://schemas.openxmlformats.org/drawingml/2006/diagram" xmlns:o="urn:schemas-microsoft-com:office:office" xmlns:v="urn:schemas-microsoft-com:vml" xmlns:pvml="urn:schemas-microsoft-com:office:powerpoint" xmlns:com="http://schemas.openxmlformats.org/drawingml/2006/compatibility" xmlns:p14="http://schemas.microsoft.com/office/powerpoint/2010/main" xmlns:p15="http://schemas.microsoft.com/office/powerpoint/2012/main" xmlns:ahyp="http://schemas.microsoft.com/office/drawing/2018/hyperlinkcolor" xmlns:go="http://customooxmlschemas.google.com/" r:id="rId56" roundtripDataSignature="AMtx7mjTCzAL9hyNzH0wzHDgWhRNAeDhCw=="/>
+      <go:slidesCustomData xmlns:go="http://customooxmlschemas.google.com/" xmlns:ahyp="http://schemas.microsoft.com/office/drawing/2018/hyperlinkcolor" xmlns:p15="http://schemas.microsoft.com/office/powerpoint/2012/main" xmlns:p14="http://schemas.microsoft.com/office/powerpoint/2010/main" xmlns:com="http://schemas.openxmlformats.org/drawingml/2006/compatibility" xmlns:pvml="urn:schemas-microsoft-com:office:powerpoint" xmlns:v="urn:schemas-microsoft-com:vml" xmlns:o="urn:schemas-microsoft-com:office:office" xmlns:dgm="http://schemas.openxmlformats.org/drawingml/2006/diagram" xmlns:c="http://schemas.openxmlformats.org/drawingml/2006/chart" xmlns:mv="urn:schemas-microsoft-com:mac:vml" xmlns:mc="http://schemas.openxmlformats.org/markup-compatibility/2006" xmlns="" r:id="rId56" roundtripDataSignature="AMtx7mjTCzAL9hyNzH0wzHDgWhRNAeDhCw=="/>
     </p:ext>
   </p:extLst>
 </p:presentation>
@@ -1805,7 +1807,7 @@
     </p:spTree>
     <p:extLst>
       <p:ext uri="{BB962C8B-B14F-4D97-AF65-F5344CB8AC3E}">
-        <p14:creationId xmlns:p14="http://schemas.microsoft.com/office/powerpoint/2010/main" val="1532709840"/>
+        <p14:creationId xmlns:p14="http://schemas.microsoft.com/office/powerpoint/2010/main" val="98582898"/>
       </p:ext>
     </p:extLst>
   </p:cSld>
@@ -1977,7 +1979,7 @@
     </p:spTree>
     <p:extLst>
       <p:ext uri="{BB962C8B-B14F-4D97-AF65-F5344CB8AC3E}">
-        <p14:creationId xmlns:p14="http://schemas.microsoft.com/office/powerpoint/2010/main" val="3328875206"/>
+        <p14:creationId xmlns:p14="http://schemas.microsoft.com/office/powerpoint/2010/main" val="1532709840"/>
       </p:ext>
     </p:extLst>
   </p:cSld>
@@ -2149,7 +2151,7 @@
     </p:spTree>
     <p:extLst>
       <p:ext uri="{BB962C8B-B14F-4D97-AF65-F5344CB8AC3E}">
-        <p14:creationId xmlns:p14="http://schemas.microsoft.com/office/powerpoint/2010/main" val="3153043551"/>
+        <p14:creationId xmlns:p14="http://schemas.microsoft.com/office/powerpoint/2010/main" val="3328875206"/>
       </p:ext>
     </p:extLst>
   </p:cSld>
@@ -2321,7 +2323,7 @@
     </p:spTree>
     <p:extLst>
       <p:ext uri="{BB962C8B-B14F-4D97-AF65-F5344CB8AC3E}">
-        <p14:creationId xmlns:p14="http://schemas.microsoft.com/office/powerpoint/2010/main" val="580120432"/>
+        <p14:creationId xmlns:p14="http://schemas.microsoft.com/office/powerpoint/2010/main" val="3153043551"/>
       </p:ext>
     </p:extLst>
   </p:cSld>
@@ -2493,7 +2495,7 @@
     </p:spTree>
     <p:extLst>
       <p:ext uri="{BB962C8B-B14F-4D97-AF65-F5344CB8AC3E}">
-        <p14:creationId xmlns:p14="http://schemas.microsoft.com/office/powerpoint/2010/main" val="243548424"/>
+        <p14:creationId xmlns:p14="http://schemas.microsoft.com/office/powerpoint/2010/main" val="580120432"/>
       </p:ext>
     </p:extLst>
   </p:cSld>
@@ -2665,7 +2667,7 @@
     </p:spTree>
     <p:extLst>
       <p:ext uri="{BB962C8B-B14F-4D97-AF65-F5344CB8AC3E}">
-        <p14:creationId xmlns:p14="http://schemas.microsoft.com/office/powerpoint/2010/main" val="1269334200"/>
+        <p14:creationId xmlns:p14="http://schemas.microsoft.com/office/powerpoint/2010/main" val="243548424"/>
       </p:ext>
     </p:extLst>
   </p:cSld>
@@ -2837,7 +2839,7 @@
     </p:spTree>
     <p:extLst>
       <p:ext uri="{BB962C8B-B14F-4D97-AF65-F5344CB8AC3E}">
-        <p14:creationId xmlns:p14="http://schemas.microsoft.com/office/powerpoint/2010/main" val="2859756314"/>
+        <p14:creationId xmlns:p14="http://schemas.microsoft.com/office/powerpoint/2010/main" val="883487585"/>
       </p:ext>
     </p:extLst>
   </p:cSld>
@@ -3009,7 +3011,7 @@
     </p:spTree>
     <p:extLst>
       <p:ext uri="{BB962C8B-B14F-4D97-AF65-F5344CB8AC3E}">
-        <p14:creationId xmlns:p14="http://schemas.microsoft.com/office/powerpoint/2010/main" val="3861693356"/>
+        <p14:creationId xmlns:p14="http://schemas.microsoft.com/office/powerpoint/2010/main" val="1269334200"/>
       </p:ext>
     </p:extLst>
   </p:cSld>
@@ -3024,7 +3026,7 @@
   <p:cSld>
     <p:spTree>
       <p:nvGrpSpPr>
-        <p:cNvPr id="1" name="Shape 530"/>
+        <p:cNvPr id="1" name="Shape 113"/>
         <p:cNvGrpSpPr/>
         <p:nvPr/>
       </p:nvGrpSpPr>
@@ -3038,45 +3040,7 @@
       </p:grpSpPr>
       <p:sp>
         <p:nvSpPr>
-          <p:cNvPr id="531" name="Google Shape;531;p31:notes"/>
-          <p:cNvSpPr txBox="1">
-            <a:spLocks noGrp="1"/>
-          </p:cNvSpPr>
-          <p:nvPr>
-            <p:ph type="body" idx="1"/>
-          </p:nvPr>
-        </p:nvSpPr>
-        <p:spPr>
-          <a:xfrm>
-            <a:off x="685800" y="4400550"/>
-            <a:ext cx="5486400" cy="3600450"/>
-          </a:xfrm>
-          <a:prstGeom prst="rect">
-            <a:avLst/>
-          </a:prstGeom>
-        </p:spPr>
-        <p:txBody>
-          <a:bodyPr spcFirstLastPara="1" wrap="square" lIns="91425" tIns="45700" rIns="91425" bIns="45700" anchor="t" anchorCtr="0">
-            <a:noAutofit/>
-          </a:bodyPr>
-          <a:lstStyle/>
-          <a:p>
-            <a:pPr marL="0" lvl="0" indent="0" algn="l" rtl="0">
-              <a:spcBef>
-                <a:spcPts val="0"/>
-              </a:spcBef>
-              <a:spcAft>
-                <a:spcPts val="0"/>
-              </a:spcAft>
-              <a:buNone/>
-            </a:pPr>
-            <a:endParaRPr/>
-          </a:p>
-        </p:txBody>
-      </p:sp>
-      <p:sp>
-        <p:nvSpPr>
-          <p:cNvPr id="532" name="Google Shape;532;p31:notes"/>
+          <p:cNvPr id="114" name="Google Shape;114;p4:notes"/>
           <p:cNvSpPr>
             <a:spLocks noGrp="1" noRot="1" noChangeAspect="1"/>
           </p:cNvSpPr>
@@ -3113,9 +3077,287 @@
               </a:path>
             </a:pathLst>
           </a:custGeom>
+          <a:noFill/>
+          <a:ln w="12700" cap="flat" cmpd="sng">
+            <a:solidFill>
+              <a:srgbClr val="000000"/>
+            </a:solidFill>
+            <a:prstDash val="solid"/>
+            <a:round/>
+            <a:headEnd type="none" w="sm" len="sm"/>
+            <a:tailEnd type="none" w="sm" len="sm"/>
+          </a:ln>
         </p:spPr>
       </p:sp>
+      <p:sp>
+        <p:nvSpPr>
+          <p:cNvPr id="115" name="Google Shape;115;p4:notes"/>
+          <p:cNvSpPr txBox="1">
+            <a:spLocks noGrp="1"/>
+          </p:cNvSpPr>
+          <p:nvPr>
+            <p:ph type="body" idx="1"/>
+          </p:nvPr>
+        </p:nvSpPr>
+        <p:spPr>
+          <a:xfrm>
+            <a:off x="685800" y="4400550"/>
+            <a:ext cx="5486400" cy="3600450"/>
+          </a:xfrm>
+          <a:prstGeom prst="rect">
+            <a:avLst/>
+          </a:prstGeom>
+          <a:noFill/>
+          <a:ln>
+            <a:noFill/>
+          </a:ln>
+        </p:spPr>
+        <p:txBody>
+          <a:bodyPr spcFirstLastPara="1" wrap="square" lIns="91425" tIns="45700" rIns="91425" bIns="45700" anchor="t" anchorCtr="0">
+            <a:noAutofit/>
+          </a:bodyPr>
+          <a:lstStyle/>
+          <a:p>
+            <a:pPr marL="0" lvl="0" indent="0" algn="l" rtl="0">
+              <a:spcBef>
+                <a:spcPts val="0"/>
+              </a:spcBef>
+              <a:spcAft>
+                <a:spcPts val="0"/>
+              </a:spcAft>
+              <a:buNone/>
+            </a:pPr>
+            <a:r>
+              <a:rPr lang="en-US" dirty="0"/>
+              <a:t>https://arxiv.org/abs/1604.01455</a:t>
+            </a:r>
+          </a:p>
+        </p:txBody>
+      </p:sp>
+      <p:sp>
+        <p:nvSpPr>
+          <p:cNvPr id="116" name="Google Shape;116;p4:notes"/>
+          <p:cNvSpPr txBox="1">
+            <a:spLocks noGrp="1"/>
+          </p:cNvSpPr>
+          <p:nvPr>
+            <p:ph type="sldNum" idx="12"/>
+          </p:nvPr>
+        </p:nvSpPr>
+        <p:spPr>
+          <a:xfrm>
+            <a:off x="3884613" y="8685213"/>
+            <a:ext cx="2971800" cy="458787"/>
+          </a:xfrm>
+          <a:prstGeom prst="rect">
+            <a:avLst/>
+          </a:prstGeom>
+          <a:noFill/>
+          <a:ln>
+            <a:noFill/>
+          </a:ln>
+        </p:spPr>
+        <p:txBody>
+          <a:bodyPr spcFirstLastPara="1" wrap="square" lIns="91425" tIns="45700" rIns="91425" bIns="45700" anchor="b" anchorCtr="0">
+            <a:noAutofit/>
+          </a:bodyPr>
+          <a:lstStyle/>
+          <a:p>
+            <a:pPr marL="0" lvl="0" indent="0" algn="r" rtl="0">
+              <a:spcBef>
+                <a:spcPts val="0"/>
+              </a:spcBef>
+              <a:spcAft>
+                <a:spcPts val="0"/>
+              </a:spcAft>
+              <a:buNone/>
+            </a:pPr>
+            <a:fld id="{00000000-1234-1234-1234-123412341234}" type="slidenum">
+              <a:rPr lang="en-US"/>
+              <a:t>18</a:t>
+            </a:fld>
+            <a:endParaRPr/>
+          </a:p>
+        </p:txBody>
+      </p:sp>
     </p:spTree>
+    <p:extLst>
+      <p:ext uri="{BB962C8B-B14F-4D97-AF65-F5344CB8AC3E}">
+        <p14:creationId xmlns:p14="http://schemas.microsoft.com/office/powerpoint/2010/main" val="2859756314"/>
+      </p:ext>
+    </p:extLst>
+  </p:cSld>
+  <p:clrMapOvr>
+    <a:masterClrMapping/>
+  </p:clrMapOvr>
+</p:notes>
+</file>
+
+<file path=ppt/notesSlides/notesSlide19.xml><?xml version="1.0" encoding="utf-8"?>
+<p:notes xmlns:a="http://schemas.openxmlformats.org/drawingml/2006/main" xmlns:r="http://schemas.openxmlformats.org/officeDocument/2006/relationships" xmlns:p="http://schemas.openxmlformats.org/presentationml/2006/main" showMasterSp="0" showMasterPhAnim="0">
+  <p:cSld>
+    <p:spTree>
+      <p:nvGrpSpPr>
+        <p:cNvPr id="1" name="Shape 113"/>
+        <p:cNvGrpSpPr/>
+        <p:nvPr/>
+      </p:nvGrpSpPr>
+      <p:grpSpPr>
+        <a:xfrm>
+          <a:off x="0" y="0"/>
+          <a:ext cx="0" cy="0"/>
+          <a:chOff x="0" y="0"/>
+          <a:chExt cx="0" cy="0"/>
+        </a:xfrm>
+      </p:grpSpPr>
+      <p:sp>
+        <p:nvSpPr>
+          <p:cNvPr id="114" name="Google Shape;114;p4:notes"/>
+          <p:cNvSpPr>
+            <a:spLocks noGrp="1" noRot="1" noChangeAspect="1"/>
+          </p:cNvSpPr>
+          <p:nvPr>
+            <p:ph type="sldImg" idx="2"/>
+          </p:nvPr>
+        </p:nvSpPr>
+        <p:spPr>
+          <a:xfrm>
+            <a:off x="685800" y="1143000"/>
+            <a:ext cx="5486400" cy="3086100"/>
+          </a:xfrm>
+          <a:custGeom>
+            <a:avLst/>
+            <a:gdLst/>
+            <a:ahLst/>
+            <a:cxnLst/>
+            <a:rect l="l" t="t" r="r" b="b"/>
+            <a:pathLst>
+              <a:path w="120000" h="120000" extrusionOk="0">
+                <a:moveTo>
+                  <a:pt x="0" y="0"/>
+                </a:moveTo>
+                <a:lnTo>
+                  <a:pt x="120000" y="0"/>
+                </a:lnTo>
+                <a:lnTo>
+                  <a:pt x="120000" y="120000"/>
+                </a:lnTo>
+                <a:lnTo>
+                  <a:pt x="0" y="120000"/>
+                </a:lnTo>
+                <a:close/>
+              </a:path>
+            </a:pathLst>
+          </a:custGeom>
+          <a:noFill/>
+          <a:ln w="12700" cap="flat" cmpd="sng">
+            <a:solidFill>
+              <a:srgbClr val="000000"/>
+            </a:solidFill>
+            <a:prstDash val="solid"/>
+            <a:round/>
+            <a:headEnd type="none" w="sm" len="sm"/>
+            <a:tailEnd type="none" w="sm" len="sm"/>
+          </a:ln>
+        </p:spPr>
+      </p:sp>
+      <p:sp>
+        <p:nvSpPr>
+          <p:cNvPr id="115" name="Google Shape;115;p4:notes"/>
+          <p:cNvSpPr txBox="1">
+            <a:spLocks noGrp="1"/>
+          </p:cNvSpPr>
+          <p:nvPr>
+            <p:ph type="body" idx="1"/>
+          </p:nvPr>
+        </p:nvSpPr>
+        <p:spPr>
+          <a:xfrm>
+            <a:off x="685800" y="4400550"/>
+            <a:ext cx="5486400" cy="3600450"/>
+          </a:xfrm>
+          <a:prstGeom prst="rect">
+            <a:avLst/>
+          </a:prstGeom>
+          <a:noFill/>
+          <a:ln>
+            <a:noFill/>
+          </a:ln>
+        </p:spPr>
+        <p:txBody>
+          <a:bodyPr spcFirstLastPara="1" wrap="square" lIns="91425" tIns="45700" rIns="91425" bIns="45700" anchor="t" anchorCtr="0">
+            <a:noAutofit/>
+          </a:bodyPr>
+          <a:lstStyle/>
+          <a:p>
+            <a:pPr marL="0" lvl="0" indent="0" algn="l" rtl="0">
+              <a:spcBef>
+                <a:spcPts val="0"/>
+              </a:spcBef>
+              <a:spcAft>
+                <a:spcPts val="0"/>
+              </a:spcAft>
+              <a:buNone/>
+            </a:pPr>
+            <a:r>
+              <a:rPr lang="en-US" dirty="0"/>
+              <a:t>https://arxiv.org/abs/1604.01455</a:t>
+            </a:r>
+          </a:p>
+        </p:txBody>
+      </p:sp>
+      <p:sp>
+        <p:nvSpPr>
+          <p:cNvPr id="116" name="Google Shape;116;p4:notes"/>
+          <p:cNvSpPr txBox="1">
+            <a:spLocks noGrp="1"/>
+          </p:cNvSpPr>
+          <p:nvPr>
+            <p:ph type="sldNum" idx="12"/>
+          </p:nvPr>
+        </p:nvSpPr>
+        <p:spPr>
+          <a:xfrm>
+            <a:off x="3884613" y="8685213"/>
+            <a:ext cx="2971800" cy="458787"/>
+          </a:xfrm>
+          <a:prstGeom prst="rect">
+            <a:avLst/>
+          </a:prstGeom>
+          <a:noFill/>
+          <a:ln>
+            <a:noFill/>
+          </a:ln>
+        </p:spPr>
+        <p:txBody>
+          <a:bodyPr spcFirstLastPara="1" wrap="square" lIns="91425" tIns="45700" rIns="91425" bIns="45700" anchor="b" anchorCtr="0">
+            <a:noAutofit/>
+          </a:bodyPr>
+          <a:lstStyle/>
+          <a:p>
+            <a:pPr marL="0" lvl="0" indent="0" algn="r" rtl="0">
+              <a:spcBef>
+                <a:spcPts val="0"/>
+              </a:spcBef>
+              <a:spcAft>
+                <a:spcPts val="0"/>
+              </a:spcAft>
+              <a:buNone/>
+            </a:pPr>
+            <a:fld id="{00000000-1234-1234-1234-123412341234}" type="slidenum">
+              <a:rPr lang="en-US"/>
+              <a:t>19</a:t>
+            </a:fld>
+            <a:endParaRPr/>
+          </a:p>
+        </p:txBody>
+      </p:sp>
+    </p:spTree>
+    <p:extLst>
+      <p:ext uri="{BB962C8B-B14F-4D97-AF65-F5344CB8AC3E}">
+        <p14:creationId xmlns:p14="http://schemas.microsoft.com/office/powerpoint/2010/main" val="3861693356"/>
+      </p:ext>
+    </p:extLst>
   </p:cSld>
   <p:clrMapOvr>
     <a:masterClrMapping/>
@@ -3285,6 +3527,110 @@
         <p14:creationId xmlns:p14="http://schemas.microsoft.com/office/powerpoint/2010/main" val="1452072940"/>
       </p:ext>
     </p:extLst>
+  </p:cSld>
+  <p:clrMapOvr>
+    <a:masterClrMapping/>
+  </p:clrMapOvr>
+</p:notes>
+</file>
+
+<file path=ppt/notesSlides/notesSlide20.xml><?xml version="1.0" encoding="utf-8"?>
+<p:notes xmlns:a="http://schemas.openxmlformats.org/drawingml/2006/main" xmlns:r="http://schemas.openxmlformats.org/officeDocument/2006/relationships" xmlns:p="http://schemas.openxmlformats.org/presentationml/2006/main" showMasterSp="0" showMasterPhAnim="0">
+  <p:cSld>
+    <p:spTree>
+      <p:nvGrpSpPr>
+        <p:cNvPr id="1" name="Shape 530"/>
+        <p:cNvGrpSpPr/>
+        <p:nvPr/>
+      </p:nvGrpSpPr>
+      <p:grpSpPr>
+        <a:xfrm>
+          <a:off x="0" y="0"/>
+          <a:ext cx="0" cy="0"/>
+          <a:chOff x="0" y="0"/>
+          <a:chExt cx="0" cy="0"/>
+        </a:xfrm>
+      </p:grpSpPr>
+      <p:sp>
+        <p:nvSpPr>
+          <p:cNvPr id="531" name="Google Shape;531;p31:notes"/>
+          <p:cNvSpPr txBox="1">
+            <a:spLocks noGrp="1"/>
+          </p:cNvSpPr>
+          <p:nvPr>
+            <p:ph type="body" idx="1"/>
+          </p:nvPr>
+        </p:nvSpPr>
+        <p:spPr>
+          <a:xfrm>
+            <a:off x="685800" y="4400550"/>
+            <a:ext cx="5486400" cy="3600450"/>
+          </a:xfrm>
+          <a:prstGeom prst="rect">
+            <a:avLst/>
+          </a:prstGeom>
+        </p:spPr>
+        <p:txBody>
+          <a:bodyPr spcFirstLastPara="1" wrap="square" lIns="91425" tIns="45700" rIns="91425" bIns="45700" anchor="t" anchorCtr="0">
+            <a:noAutofit/>
+          </a:bodyPr>
+          <a:lstStyle/>
+          <a:p>
+            <a:pPr marL="0" lvl="0" indent="0" algn="l" rtl="0">
+              <a:spcBef>
+                <a:spcPts val="0"/>
+              </a:spcBef>
+              <a:spcAft>
+                <a:spcPts val="0"/>
+              </a:spcAft>
+              <a:buNone/>
+            </a:pPr>
+            <a:endParaRPr/>
+          </a:p>
+        </p:txBody>
+      </p:sp>
+      <p:sp>
+        <p:nvSpPr>
+          <p:cNvPr id="532" name="Google Shape;532;p31:notes"/>
+          <p:cNvSpPr>
+            <a:spLocks noGrp="1" noRot="1" noChangeAspect="1"/>
+          </p:cNvSpPr>
+          <p:nvPr>
+            <p:ph type="sldImg" idx="2"/>
+          </p:nvPr>
+        </p:nvSpPr>
+        <p:spPr>
+          <a:xfrm>
+            <a:off x="685800" y="1143000"/>
+            <a:ext cx="5486400" cy="3086100"/>
+          </a:xfrm>
+          <a:custGeom>
+            <a:avLst/>
+            <a:gdLst/>
+            <a:ahLst/>
+            <a:cxnLst/>
+            <a:rect l="l" t="t" r="r" b="b"/>
+            <a:pathLst>
+              <a:path w="120000" h="120000" extrusionOk="0">
+                <a:moveTo>
+                  <a:pt x="0" y="0"/>
+                </a:moveTo>
+                <a:lnTo>
+                  <a:pt x="120000" y="0"/>
+                </a:lnTo>
+                <a:lnTo>
+                  <a:pt x="120000" y="120000"/>
+                </a:lnTo>
+                <a:lnTo>
+                  <a:pt x="0" y="120000"/>
+                </a:lnTo>
+                <a:close/>
+              </a:path>
+            </a:pathLst>
+          </a:custGeom>
+        </p:spPr>
+      </p:sp>
+    </p:spTree>
   </p:cSld>
   <p:clrMapOvr>
     <a:masterClrMapping/>
@@ -3970,7 +4316,7 @@
     </p:spTree>
     <p:extLst>
       <p:ext uri="{BB962C8B-B14F-4D97-AF65-F5344CB8AC3E}">
-        <p14:creationId xmlns:p14="http://schemas.microsoft.com/office/powerpoint/2010/main" val="1724119678"/>
+        <p14:creationId xmlns:p14="http://schemas.microsoft.com/office/powerpoint/2010/main" val="2754511813"/>
       </p:ext>
     </p:extLst>
   </p:cSld>
@@ -4142,7 +4488,7 @@
     </p:spTree>
     <p:extLst>
       <p:ext uri="{BB962C8B-B14F-4D97-AF65-F5344CB8AC3E}">
-        <p14:creationId xmlns:p14="http://schemas.microsoft.com/office/powerpoint/2010/main" val="2461705595"/>
+        <p14:creationId xmlns:p14="http://schemas.microsoft.com/office/powerpoint/2010/main" val="1724119678"/>
       </p:ext>
     </p:extLst>
   </p:cSld>
@@ -4314,7 +4660,7 @@
     </p:spTree>
     <p:extLst>
       <p:ext uri="{BB962C8B-B14F-4D97-AF65-F5344CB8AC3E}">
-        <p14:creationId xmlns:p14="http://schemas.microsoft.com/office/powerpoint/2010/main" val="1624145259"/>
+        <p14:creationId xmlns:p14="http://schemas.microsoft.com/office/powerpoint/2010/main" val="2461705595"/>
       </p:ext>
     </p:extLst>
   </p:cSld>
@@ -4486,7 +4832,7 @@
     </p:spTree>
     <p:extLst>
       <p:ext uri="{BB962C8B-B14F-4D97-AF65-F5344CB8AC3E}">
-        <p14:creationId xmlns:p14="http://schemas.microsoft.com/office/powerpoint/2010/main" val="98582898"/>
+        <p14:creationId xmlns:p14="http://schemas.microsoft.com/office/powerpoint/2010/main" val="1624145259"/>
       </p:ext>
     </p:extLst>
   </p:cSld>
@@ -14732,6 +15078,15 @@
               <a:buNone/>
             </a:pPr>
             <a:r>
+              <a:rPr lang="en-US" b="1" dirty="0">
+                <a:latin typeface="Agency FB Black Condensed"/>
+                <a:ea typeface="Garamond"/>
+                <a:cs typeface="Garamond"/>
+                <a:sym typeface="Garamond"/>
+              </a:rPr>
+              <a:t>Model EDA with </a:t>
+            </a:r>
+            <a:r>
               <a:rPr lang="en-US" b="1" dirty="0" err="1">
                 <a:latin typeface="Agency FB Black Condensed"/>
                 <a:ea typeface="Garamond"/>
@@ -14739,15 +15094,6 @@
                 <a:sym typeface="Garamond"/>
               </a:rPr>
               <a:t>PyCaret</a:t>
-            </a:r>
-            <a:r>
-              <a:rPr lang="en-US" b="1" dirty="0">
-                <a:latin typeface="Agency FB Black Condensed"/>
-                <a:ea typeface="Garamond"/>
-                <a:cs typeface="Garamond"/>
-                <a:sym typeface="Garamond"/>
-              </a:rPr>
-              <a:t> overview</a:t>
             </a:r>
             <a:endParaRPr dirty="0">
               <a:latin typeface="Agency FB Black Condensed"/>
@@ -14784,7 +15130,7 @@
           </a:bodyPr>
           <a:lstStyle/>
           <a:p>
-            <a:pPr marL="457200" lvl="1" indent="0" algn="just">
+            <a:pPr marL="342900" algn="just">
               <a:lnSpc>
                 <a:spcPct val="150000"/>
               </a:lnSpc>
@@ -14792,7 +15138,138 @@
                 <a:spcPts val="0"/>
               </a:spcBef>
               <a:buSzPts val="2800"/>
-              <a:buNone/>
+              <a:buFont typeface="Arial" panose="020B0604020202020204" pitchFamily="34" charset="0"/>
+              <a:buChar char="•"/>
+            </a:pPr>
+            <a:r>
+              <a:rPr lang="en-US" sz="2400" b="1" dirty="0">
+                <a:latin typeface="Agency FB Black Condensed"/>
+              </a:rPr>
+              <a:t>Advantages: </a:t>
+            </a:r>
+          </a:p>
+          <a:p>
+            <a:pPr marL="800100" lvl="1" algn="just">
+              <a:lnSpc>
+                <a:spcPct val="150000"/>
+              </a:lnSpc>
+              <a:spcBef>
+                <a:spcPts val="0"/>
+              </a:spcBef>
+              <a:buSzPts val="2800"/>
+              <a:buFont typeface="Arial" panose="020B0604020202020204" pitchFamily="34" charset="0"/>
+              <a:buChar char="•"/>
+            </a:pPr>
+            <a:r>
+              <a:rPr lang="en-US" dirty="0">
+                <a:latin typeface="Agency FB Black Condensed"/>
+              </a:rPr>
+              <a:t>Low code Python library</a:t>
+            </a:r>
+          </a:p>
+          <a:p>
+            <a:pPr marL="800100" lvl="1" algn="just">
+              <a:lnSpc>
+                <a:spcPct val="150000"/>
+              </a:lnSpc>
+              <a:spcBef>
+                <a:spcPts val="0"/>
+              </a:spcBef>
+              <a:buSzPts val="2800"/>
+              <a:buFont typeface="Arial" panose="020B0604020202020204" pitchFamily="34" charset="0"/>
+              <a:buChar char="•"/>
+            </a:pPr>
+            <a:r>
+              <a:rPr lang="en-US" dirty="0">
+                <a:latin typeface="Agency FB Black Condensed"/>
+              </a:rPr>
+              <a:t>High level overview of regression models and their results </a:t>
+            </a:r>
+          </a:p>
+          <a:p>
+            <a:pPr marL="800100" lvl="1" algn="just">
+              <a:lnSpc>
+                <a:spcPct val="150000"/>
+              </a:lnSpc>
+              <a:spcBef>
+                <a:spcPts val="0"/>
+              </a:spcBef>
+              <a:buSzPts val="2800"/>
+              <a:buFont typeface="Arial" panose="020B0604020202020204" pitchFamily="34" charset="0"/>
+              <a:buChar char="•"/>
+            </a:pPr>
+            <a:r>
+              <a:rPr lang="en-US" dirty="0">
+                <a:latin typeface="Agency FB Black Condensed"/>
+              </a:rPr>
+              <a:t>Ideas for exploration (accuracy vs time)</a:t>
+            </a:r>
+          </a:p>
+          <a:p>
+            <a:pPr marL="342900" algn="just">
+              <a:lnSpc>
+                <a:spcPct val="150000"/>
+              </a:lnSpc>
+              <a:spcBef>
+                <a:spcPts val="0"/>
+              </a:spcBef>
+              <a:buSzPts val="2800"/>
+              <a:buFont typeface="Arial" panose="020B0604020202020204" pitchFamily="34" charset="0"/>
+              <a:buChar char="•"/>
+            </a:pPr>
+            <a:r>
+              <a:rPr lang="en-US" sz="2400" b="1" dirty="0">
+                <a:latin typeface="Agency FB Black Condensed"/>
+              </a:rPr>
+              <a:t>Disadvantages:</a:t>
+            </a:r>
+          </a:p>
+          <a:p>
+            <a:pPr marL="800100" lvl="1" algn="just">
+              <a:lnSpc>
+                <a:spcPct val="150000"/>
+              </a:lnSpc>
+              <a:spcBef>
+                <a:spcPts val="0"/>
+              </a:spcBef>
+              <a:buSzPts val="2800"/>
+              <a:buFont typeface="Arial" panose="020B0604020202020204" pitchFamily="34" charset="0"/>
+              <a:buChar char="•"/>
+            </a:pPr>
+            <a:r>
+              <a:rPr lang="en-US" dirty="0">
+                <a:latin typeface="Agency FB Black Condensed"/>
+              </a:rPr>
+              <a:t>Blackbox solution</a:t>
+            </a:r>
+          </a:p>
+          <a:p>
+            <a:pPr marL="800100" lvl="1" algn="just">
+              <a:lnSpc>
+                <a:spcPct val="150000"/>
+              </a:lnSpc>
+              <a:spcBef>
+                <a:spcPts val="0"/>
+              </a:spcBef>
+              <a:buSzPts val="2800"/>
+              <a:buFont typeface="Arial" panose="020B0604020202020204" pitchFamily="34" charset="0"/>
+              <a:buChar char="•"/>
+            </a:pPr>
+            <a:endParaRPr lang="en-US" dirty="0">
+              <a:latin typeface="Agency FB Black Condensed"/>
+            </a:endParaRPr>
+          </a:p>
+          <a:p>
+            <a:pPr marL="800100" lvl="1" algn="just">
+              <a:lnSpc>
+                <a:spcPct val="150000"/>
+              </a:lnSpc>
+              <a:spcBef>
+                <a:spcPts val="0"/>
+              </a:spcBef>
+              <a:buSzPts val="2800"/>
+              <a:buFont typeface="Arial" panose="020B0604020202020204" pitchFamily="34" charset="0"/>
+              <a:buChar char="•"/>
             </a:pPr>
             <a:endParaRPr lang="en-US" sz="2000" dirty="0">
               <a:latin typeface="Agency FB Black Condensed"/>
@@ -14863,6 +15340,54 @@
             </a:endParaRPr>
           </a:p>
           <a:p>
+            <a:pPr marL="800100" lvl="1" algn="just">
+              <a:lnSpc>
+                <a:spcPct val="150000"/>
+              </a:lnSpc>
+              <a:spcBef>
+                <a:spcPts val="0"/>
+              </a:spcBef>
+              <a:buSzPts val="2800"/>
+              <a:buFont typeface="Arial" panose="020B0604020202020204" pitchFamily="34" charset="0"/>
+              <a:buChar char="•"/>
+            </a:pPr>
+            <a:endParaRPr lang="en-US" sz="2000" dirty="0">
+              <a:latin typeface="Agency FB Black Condensed"/>
+            </a:endParaRPr>
+          </a:p>
+          <a:p>
+            <a:pPr marL="800100" lvl="1" algn="just">
+              <a:lnSpc>
+                <a:spcPct val="150000"/>
+              </a:lnSpc>
+              <a:spcBef>
+                <a:spcPts val="0"/>
+              </a:spcBef>
+              <a:buSzPts val="2800"/>
+              <a:buFont typeface="Arial" panose="020B0604020202020204" pitchFamily="34" charset="0"/>
+              <a:buChar char="•"/>
+            </a:pPr>
+            <a:endParaRPr lang="en-US" sz="2000" dirty="0">
+              <a:latin typeface="Agency FB Black Condensed"/>
+            </a:endParaRPr>
+          </a:p>
+          <a:p>
+            <a:pPr marL="800100" lvl="1" algn="just">
+              <a:lnSpc>
+                <a:spcPct val="150000"/>
+              </a:lnSpc>
+              <a:spcBef>
+                <a:spcPts val="0"/>
+              </a:spcBef>
+              <a:buSzPts val="2800"/>
+              <a:buFont typeface="Arial" panose="020B0604020202020204" pitchFamily="34" charset="0"/>
+              <a:buChar char="•"/>
+            </a:pPr>
+            <a:endParaRPr lang="en-US" sz="2000" dirty="0">
+              <a:latin typeface="Agency FB Black Condensed"/>
+            </a:endParaRPr>
+          </a:p>
+          <a:p>
             <a:pPr marL="342900" algn="just">
               <a:lnSpc>
                 <a:spcPct val="150000"/>
@@ -14954,40 +15479,10 @@
           </a:p>
         </p:txBody>
       </p:sp>
-      <p:pic>
-        <p:nvPicPr>
-          <p:cNvPr id="2" name="Picture 1">
-            <a:extLst>
-              <a:ext uri="{FF2B5EF4-FFF2-40B4-BE49-F238E27FC236}">
-                <a16:creationId xmlns:a16="http://schemas.microsoft.com/office/drawing/2014/main" id="{462C43F8-C91C-4ED6-BB2F-BC2F092EE566}"/>
-              </a:ext>
-            </a:extLst>
-          </p:cNvPr>
-          <p:cNvPicPr>
-            <a:picLocks noChangeAspect="1"/>
-          </p:cNvPicPr>
-          <p:nvPr/>
-        </p:nvPicPr>
-        <p:blipFill>
-          <a:blip r:embed="rId3"/>
-          <a:stretch>
-            <a:fillRect/>
-          </a:stretch>
-        </p:blipFill>
-        <p:spPr>
-          <a:xfrm>
-            <a:off x="1843469" y="1481559"/>
-            <a:ext cx="8505061" cy="5138315"/>
-          </a:xfrm>
-          <a:prstGeom prst="rect">
-            <a:avLst/>
-          </a:prstGeom>
-        </p:spPr>
-      </p:pic>
     </p:spTree>
     <p:extLst>
       <p:ext uri="{BB962C8B-B14F-4D97-AF65-F5344CB8AC3E}">
-        <p14:creationId xmlns:p14="http://schemas.microsoft.com/office/powerpoint/2010/main" val="2881967951"/>
+        <p14:creationId xmlns:p14="http://schemas.microsoft.com/office/powerpoint/2010/main" val="1521044736"/>
       </p:ext>
     </p:extLst>
   </p:cSld>
@@ -15061,21 +15556,24 @@
               <a:buNone/>
             </a:pPr>
             <a:r>
-              <a:rPr lang="en-US" b="1" dirty="0">
-                <a:solidFill>
-                  <a:srgbClr val="FF0000"/>
-                </a:solidFill>
+              <a:rPr lang="en-US" b="1" dirty="0" err="1">
                 <a:latin typeface="Agency FB Black Condensed"/>
                 <a:ea typeface="Garamond"/>
                 <a:cs typeface="Garamond"/>
                 <a:sym typeface="Garamond"/>
               </a:rPr>
-              <a:t>Improve the table and highlight points</a:t>
+              <a:t>PyCaret</a:t>
+            </a:r>
+            <a:r>
+              <a:rPr lang="en-US" b="1" dirty="0">
+                <a:latin typeface="Agency FB Black Condensed"/>
+                <a:ea typeface="Garamond"/>
+                <a:cs typeface="Garamond"/>
+                <a:sym typeface="Garamond"/>
+              </a:rPr>
+              <a:t> overview</a:t>
             </a:r>
             <a:endParaRPr dirty="0">
-              <a:solidFill>
-                <a:srgbClr val="FF0000"/>
-              </a:solidFill>
               <a:latin typeface="Agency FB Black Condensed"/>
             </a:endParaRPr>
           </a:p>
@@ -15313,7 +15811,7 @@
     </p:spTree>
     <p:extLst>
       <p:ext uri="{BB962C8B-B14F-4D97-AF65-F5344CB8AC3E}">
-        <p14:creationId xmlns:p14="http://schemas.microsoft.com/office/powerpoint/2010/main" val="4026713169"/>
+        <p14:creationId xmlns:p14="http://schemas.microsoft.com/office/powerpoint/2010/main" val="2881967951"/>
       </p:ext>
     </p:extLst>
   </p:cSld>
@@ -15388,14 +15886,20 @@
             </a:pPr>
             <a:r>
               <a:rPr lang="en-US" b="1" dirty="0">
+                <a:solidFill>
+                  <a:srgbClr val="FF0000"/>
+                </a:solidFill>
                 <a:latin typeface="Agency FB Black Condensed"/>
                 <a:ea typeface="Garamond"/>
                 <a:cs typeface="Garamond"/>
                 <a:sym typeface="Garamond"/>
               </a:rPr>
-              <a:t>Selected supervised learning models </a:t>
+              <a:t>Improve the table and highlight points</a:t>
             </a:r>
             <a:endParaRPr dirty="0">
+              <a:solidFill>
+                <a:srgbClr val="FF0000"/>
+              </a:solidFill>
               <a:latin typeface="Agency FB Black Condensed"/>
             </a:endParaRPr>
           </a:p>
@@ -15430,6 +15934,85 @@
           </a:bodyPr>
           <a:lstStyle/>
           <a:p>
+            <a:pPr marL="457200" lvl="1" indent="0" algn="just">
+              <a:lnSpc>
+                <a:spcPct val="150000"/>
+              </a:lnSpc>
+              <a:spcBef>
+                <a:spcPts val="0"/>
+              </a:spcBef>
+              <a:buSzPts val="2800"/>
+              <a:buNone/>
+            </a:pPr>
+            <a:endParaRPr lang="en-US" sz="2000" dirty="0">
+              <a:latin typeface="Agency FB Black Condensed"/>
+            </a:endParaRPr>
+          </a:p>
+          <a:p>
+            <a:pPr marL="800100" lvl="1" algn="just">
+              <a:lnSpc>
+                <a:spcPct val="150000"/>
+              </a:lnSpc>
+              <a:spcBef>
+                <a:spcPts val="0"/>
+              </a:spcBef>
+              <a:buSzPts val="2800"/>
+              <a:buFont typeface="Arial" panose="020B0604020202020204" pitchFamily="34" charset="0"/>
+              <a:buChar char="•"/>
+            </a:pPr>
+            <a:endParaRPr lang="en-US" sz="2000" dirty="0">
+              <a:latin typeface="Agency FB Black Condensed"/>
+            </a:endParaRPr>
+          </a:p>
+          <a:p>
+            <a:pPr marL="800100" lvl="1" algn="just">
+              <a:lnSpc>
+                <a:spcPct val="150000"/>
+              </a:lnSpc>
+              <a:spcBef>
+                <a:spcPts val="0"/>
+              </a:spcBef>
+              <a:buSzPts val="2800"/>
+              <a:buFont typeface="Arial" panose="020B0604020202020204" pitchFamily="34" charset="0"/>
+              <a:buChar char="•"/>
+            </a:pPr>
+            <a:endParaRPr lang="en-US" sz="2000" dirty="0">
+              <a:latin typeface="Agency FB Black Condensed"/>
+            </a:endParaRPr>
+          </a:p>
+          <a:p>
+            <a:pPr marL="800100" lvl="1" algn="just">
+              <a:lnSpc>
+                <a:spcPct val="150000"/>
+              </a:lnSpc>
+              <a:spcBef>
+                <a:spcPts val="0"/>
+              </a:spcBef>
+              <a:buSzPts val="2800"/>
+              <a:buFont typeface="Arial" panose="020B0604020202020204" pitchFamily="34" charset="0"/>
+              <a:buChar char="•"/>
+            </a:pPr>
+            <a:endParaRPr lang="en-US" sz="2000" dirty="0">
+              <a:latin typeface="Agency FB Black Condensed"/>
+            </a:endParaRPr>
+          </a:p>
+          <a:p>
+            <a:pPr marL="800100" lvl="1" algn="just">
+              <a:lnSpc>
+                <a:spcPct val="150000"/>
+              </a:lnSpc>
+              <a:spcBef>
+                <a:spcPts val="0"/>
+              </a:spcBef>
+              <a:buSzPts val="2800"/>
+              <a:buFont typeface="Arial" panose="020B0604020202020204" pitchFamily="34" charset="0"/>
+              <a:buChar char="•"/>
+            </a:pPr>
+            <a:endParaRPr lang="en-US" sz="2000" dirty="0">
+              <a:latin typeface="Agency FB Black Condensed"/>
+            </a:endParaRPr>
+          </a:p>
+          <a:p>
             <a:pPr marL="342900" algn="just">
               <a:lnSpc>
                 <a:spcPct val="150000"/>
@@ -15441,110 +16024,12 @@
               <a:buFont typeface="Arial" panose="020B0604020202020204" pitchFamily="34" charset="0"/>
               <a:buChar char="•"/>
             </a:pPr>
-            <a:r>
-              <a:rPr lang="en-US" sz="2400" b="1" dirty="0">
-                <a:latin typeface="Agency FB Black Condensed"/>
-              </a:rPr>
-              <a:t>Boosting algorithms:</a:t>
-            </a:r>
-          </a:p>
-          <a:p>
-            <a:pPr marL="800100" lvl="1" algn="just">
-              <a:lnSpc>
-                <a:spcPct val="150000"/>
-              </a:lnSpc>
-              <a:spcBef>
-                <a:spcPts val="0"/>
-              </a:spcBef>
-              <a:buSzPts val="2800"/>
-              <a:buFont typeface="Arial" panose="020B0604020202020204" pitchFamily="34" charset="0"/>
-              <a:buChar char="•"/>
-            </a:pPr>
-            <a:r>
-              <a:rPr lang="en-US" dirty="0">
-                <a:latin typeface="Agency FB Black Condensed"/>
-              </a:rPr>
-              <a:t>Gradient Boosting</a:t>
-            </a:r>
-          </a:p>
-          <a:p>
-            <a:pPr marL="800100" lvl="1" algn="just">
-              <a:lnSpc>
-                <a:spcPct val="150000"/>
-              </a:lnSpc>
-              <a:spcBef>
-                <a:spcPts val="0"/>
-              </a:spcBef>
-              <a:buSzPts val="2800"/>
-              <a:buFont typeface="Arial" panose="020B0604020202020204" pitchFamily="34" charset="0"/>
-              <a:buChar char="•"/>
-            </a:pPr>
-            <a:r>
-              <a:rPr lang="en-US" dirty="0">
-                <a:latin typeface="Agency FB Black Condensed"/>
-              </a:rPr>
-              <a:t>Light Gradient Boosting Machine</a:t>
-            </a:r>
+            <a:endParaRPr lang="en-US" sz="2400" dirty="0">
+              <a:latin typeface="Agency FB Black Condensed"/>
+            </a:endParaRPr>
           </a:p>
           <a:p>
             <a:pPr marL="342900" algn="just">
-              <a:lnSpc>
-                <a:spcPct val="150000"/>
-              </a:lnSpc>
-              <a:spcBef>
-                <a:spcPts val="0"/>
-              </a:spcBef>
-              <a:buSzPts val="2800"/>
-              <a:buFont typeface="Arial" panose="020B0604020202020204" pitchFamily="34" charset="0"/>
-              <a:buChar char="•"/>
-            </a:pPr>
-            <a:r>
-              <a:rPr lang="en-US" sz="2400" b="1" dirty="0">
-                <a:latin typeface="Agency FB Black Condensed"/>
-              </a:rPr>
-              <a:t>Regressions:</a:t>
-            </a:r>
-          </a:p>
-          <a:p>
-            <a:pPr marL="800100" lvl="1" algn="just">
-              <a:lnSpc>
-                <a:spcPct val="150000"/>
-              </a:lnSpc>
-              <a:spcBef>
-                <a:spcPts val="0"/>
-              </a:spcBef>
-              <a:buSzPts val="2800"/>
-              <a:buFont typeface="Arial" panose="020B0604020202020204" pitchFamily="34" charset="0"/>
-              <a:buChar char="•"/>
-            </a:pPr>
-            <a:r>
-              <a:rPr lang="en-US" dirty="0">
-                <a:latin typeface="Agency FB Black Condensed"/>
-              </a:rPr>
-              <a:t>Linear Regression</a:t>
-            </a:r>
-          </a:p>
-          <a:p>
-            <a:pPr marL="800100" lvl="1" algn="just">
-              <a:lnSpc>
-                <a:spcPct val="150000"/>
-              </a:lnSpc>
-              <a:spcBef>
-                <a:spcPts val="0"/>
-              </a:spcBef>
-              <a:buSzPts val="2800"/>
-              <a:buFont typeface="Arial" panose="020B0604020202020204" pitchFamily="34" charset="0"/>
-              <a:buChar char="•"/>
-            </a:pPr>
-            <a:r>
-              <a:rPr lang="en-US" dirty="0">
-                <a:latin typeface="Agency FB Black Condensed"/>
-              </a:rPr>
-              <a:t>Ridge Regression</a:t>
-            </a:r>
-          </a:p>
-          <a:p>
-            <a:pPr marL="800100" lvl="1" algn="just">
               <a:lnSpc>
                 <a:spcPct val="150000"/>
               </a:lnSpc>
@@ -15562,7 +16047,7 @@
           <a:p>
             <a:pPr marL="800100" lvl="1" algn="just">
               <a:lnSpc>
-                <a:spcPct val="150000"/>
+                <a:spcPct val="100000"/>
               </a:lnSpc>
               <a:spcBef>
                 <a:spcPts val="0"/>
@@ -15576,7 +16061,7 @@
             </a:endParaRPr>
           </a:p>
           <a:p>
-            <a:pPr marL="800100" lvl="1" algn="just">
+            <a:pPr indent="-457200" algn="just">
               <a:lnSpc>
                 <a:spcPct val="150000"/>
               </a:lnSpc>
@@ -15584,158 +16069,12 @@
                 <a:spcPts val="0"/>
               </a:spcBef>
               <a:buSzPts val="2800"/>
-              <a:buFont typeface="Arial" panose="020B0604020202020204" pitchFamily="34" charset="0"/>
-              <a:buChar char="•"/>
-            </a:pPr>
-            <a:endParaRPr lang="en-US" sz="2000" dirty="0">
-              <a:latin typeface="Agency FB Black Condensed"/>
-            </a:endParaRPr>
-          </a:p>
-          <a:p>
-            <a:pPr marL="800100" lvl="1" algn="just">
-              <a:lnSpc>
-                <a:spcPct val="150000"/>
-              </a:lnSpc>
-              <a:spcBef>
-                <a:spcPts val="0"/>
-              </a:spcBef>
-              <a:buSzPts val="2800"/>
-              <a:buFont typeface="Arial" panose="020B0604020202020204" pitchFamily="34" charset="0"/>
-              <a:buChar char="•"/>
-            </a:pPr>
-            <a:endParaRPr lang="en-US" sz="2000" dirty="0">
-              <a:latin typeface="Agency FB Black Condensed"/>
-            </a:endParaRPr>
-          </a:p>
-          <a:p>
-            <a:pPr marL="800100" lvl="1" algn="just">
-              <a:lnSpc>
-                <a:spcPct val="150000"/>
-              </a:lnSpc>
-              <a:spcBef>
-                <a:spcPts val="0"/>
-              </a:spcBef>
-              <a:buSzPts val="2800"/>
-              <a:buFont typeface="Arial" panose="020B0604020202020204" pitchFamily="34" charset="0"/>
-              <a:buChar char="•"/>
-            </a:pPr>
-            <a:endParaRPr lang="en-US" sz="2000" dirty="0">
-              <a:latin typeface="Agency FB Black Condensed"/>
-            </a:endParaRPr>
-          </a:p>
-          <a:p>
-            <a:pPr marL="800100" lvl="1" algn="just">
-              <a:lnSpc>
-                <a:spcPct val="150000"/>
-              </a:lnSpc>
-              <a:spcBef>
-                <a:spcPts val="0"/>
-              </a:spcBef>
-              <a:buSzPts val="2800"/>
-              <a:buFont typeface="Arial" panose="020B0604020202020204" pitchFamily="34" charset="0"/>
-              <a:buChar char="•"/>
-            </a:pPr>
-            <a:endParaRPr lang="en-US" sz="2000" dirty="0">
-              <a:latin typeface="Agency FB Black Condensed"/>
-            </a:endParaRPr>
-          </a:p>
-          <a:p>
-            <a:pPr marL="800100" lvl="1" algn="just">
-              <a:lnSpc>
-                <a:spcPct val="150000"/>
-              </a:lnSpc>
-              <a:spcBef>
-                <a:spcPts val="0"/>
-              </a:spcBef>
-              <a:buSzPts val="2800"/>
-              <a:buFont typeface="Arial" panose="020B0604020202020204" pitchFamily="34" charset="0"/>
-              <a:buChar char="•"/>
-            </a:pPr>
-            <a:endParaRPr lang="en-US" sz="2000" dirty="0">
-              <a:latin typeface="Agency FB Black Condensed"/>
-            </a:endParaRPr>
-          </a:p>
-          <a:p>
-            <a:pPr marL="800100" lvl="1" algn="just">
-              <a:lnSpc>
-                <a:spcPct val="150000"/>
-              </a:lnSpc>
-              <a:spcBef>
-                <a:spcPts val="0"/>
-              </a:spcBef>
-              <a:buSzPts val="2800"/>
-              <a:buFont typeface="Arial" panose="020B0604020202020204" pitchFamily="34" charset="0"/>
-              <a:buChar char="•"/>
-            </a:pPr>
-            <a:endParaRPr lang="en-US" sz="2000" dirty="0">
-              <a:latin typeface="Agency FB Black Condensed"/>
-            </a:endParaRPr>
-          </a:p>
-          <a:p>
-            <a:pPr marL="800100" lvl="1" algn="just">
-              <a:lnSpc>
-                <a:spcPct val="150000"/>
-              </a:lnSpc>
-              <a:spcBef>
-                <a:spcPts val="0"/>
-              </a:spcBef>
-              <a:buSzPts val="2800"/>
-              <a:buFont typeface="Arial" panose="020B0604020202020204" pitchFamily="34" charset="0"/>
-              <a:buChar char="•"/>
-            </a:pPr>
-            <a:endParaRPr lang="en-US" sz="2000" dirty="0">
-              <a:latin typeface="Agency FB Black Condensed"/>
-            </a:endParaRPr>
-          </a:p>
-          <a:p>
-            <a:pPr marL="342900" algn="just">
-              <a:lnSpc>
-                <a:spcPct val="150000"/>
-              </a:lnSpc>
-              <a:spcBef>
-                <a:spcPts val="0"/>
-              </a:spcBef>
-              <a:buSzPts val="2800"/>
-              <a:buFont typeface="Arial" panose="020B0604020202020204" pitchFamily="34" charset="0"/>
-              <a:buChar char="•"/>
             </a:pPr>
             <a:endParaRPr lang="en-US" sz="2400" dirty="0">
               <a:latin typeface="Agency FB Black Condensed"/>
             </a:endParaRPr>
           </a:p>
           <a:p>
-            <a:pPr marL="342900" algn="just">
-              <a:lnSpc>
-                <a:spcPct val="150000"/>
-              </a:lnSpc>
-              <a:spcBef>
-                <a:spcPts val="0"/>
-              </a:spcBef>
-              <a:buSzPts val="2800"/>
-              <a:buFont typeface="Arial" panose="020B0604020202020204" pitchFamily="34" charset="0"/>
-              <a:buChar char="•"/>
-            </a:pPr>
-            <a:endParaRPr lang="en-US" dirty="0">
-              <a:latin typeface="Agency FB Black Condensed"/>
-            </a:endParaRPr>
-          </a:p>
-          <a:p>
-            <a:pPr marL="800100" lvl="1" algn="just">
-              <a:lnSpc>
-                <a:spcPct val="100000"/>
-              </a:lnSpc>
-              <a:spcBef>
-                <a:spcPts val="0"/>
-              </a:spcBef>
-              <a:buSzPts val="2800"/>
-              <a:buFont typeface="Arial" panose="020B0604020202020204" pitchFamily="34" charset="0"/>
-              <a:buChar char="•"/>
-            </a:pPr>
-            <a:endParaRPr lang="en-US" sz="2000" dirty="0">
-              <a:latin typeface="Agency FB Black Condensed"/>
-            </a:endParaRPr>
-          </a:p>
-          <a:p>
             <a:pPr indent="-457200" algn="just">
               <a:lnSpc>
                 <a:spcPct val="150000"/>
@@ -15759,30 +16098,46 @@
               </a:spcBef>
               <a:buSzPts val="2800"/>
             </a:pPr>
-            <a:endParaRPr lang="en-US" sz="2400" dirty="0">
-              <a:latin typeface="Agency FB Black Condensed"/>
-            </a:endParaRPr>
-          </a:p>
-          <a:p>
-            <a:pPr indent="-457200" algn="just">
-              <a:lnSpc>
-                <a:spcPct val="150000"/>
-              </a:lnSpc>
-              <a:spcBef>
-                <a:spcPts val="0"/>
-              </a:spcBef>
-              <a:buSzPts val="2800"/>
-            </a:pPr>
             <a:endParaRPr lang="en-US" sz="2400" b="1" dirty="0">
               <a:latin typeface="Agency FB Black Condensed"/>
             </a:endParaRPr>
           </a:p>
         </p:txBody>
       </p:sp>
+      <p:pic>
+        <p:nvPicPr>
+          <p:cNvPr id="2" name="Picture 1">
+            <a:extLst>
+              <a:ext uri="{FF2B5EF4-FFF2-40B4-BE49-F238E27FC236}">
+                <a16:creationId xmlns:a16="http://schemas.microsoft.com/office/drawing/2014/main" id="{462C43F8-C91C-4ED6-BB2F-BC2F092EE566}"/>
+              </a:ext>
+            </a:extLst>
+          </p:cNvPr>
+          <p:cNvPicPr>
+            <a:picLocks noChangeAspect="1"/>
+          </p:cNvPicPr>
+          <p:nvPr/>
+        </p:nvPicPr>
+        <p:blipFill>
+          <a:blip r:embed="rId3"/>
+          <a:stretch>
+            <a:fillRect/>
+          </a:stretch>
+        </p:blipFill>
+        <p:spPr>
+          <a:xfrm>
+            <a:off x="1843469" y="1481559"/>
+            <a:ext cx="8505061" cy="5138315"/>
+          </a:xfrm>
+          <a:prstGeom prst="rect">
+            <a:avLst/>
+          </a:prstGeom>
+        </p:spPr>
+      </p:pic>
     </p:spTree>
     <p:extLst>
       <p:ext uri="{BB962C8B-B14F-4D97-AF65-F5344CB8AC3E}">
-        <p14:creationId xmlns:p14="http://schemas.microsoft.com/office/powerpoint/2010/main" val="3176474029"/>
+        <p14:creationId xmlns:p14="http://schemas.microsoft.com/office/powerpoint/2010/main" val="4026713169"/>
       </p:ext>
     </p:extLst>
   </p:cSld>
@@ -15862,7 +16217,7 @@
                 <a:cs typeface="Garamond"/>
                 <a:sym typeface="Garamond"/>
               </a:rPr>
-              <a:t>Explain each model per slide</a:t>
+              <a:t>Selected supervised learning models </a:t>
             </a:r>
             <a:endParaRPr dirty="0">
               <a:latin typeface="Agency FB Black Condensed"/>
@@ -15914,7 +16269,45 @@
               <a:rPr lang="en-US" sz="2400" b="1" dirty="0">
                 <a:latin typeface="Agency FB Black Condensed"/>
               </a:rPr>
-              <a:t>Metrics</a:t>
+              <a:t>Boosting algorithms:</a:t>
+            </a:r>
+          </a:p>
+          <a:p>
+            <a:pPr marL="800100" lvl="1" algn="just">
+              <a:lnSpc>
+                <a:spcPct val="150000"/>
+              </a:lnSpc>
+              <a:spcBef>
+                <a:spcPts val="0"/>
+              </a:spcBef>
+              <a:buSzPts val="2800"/>
+              <a:buFont typeface="Arial" panose="020B0604020202020204" pitchFamily="34" charset="0"/>
+              <a:buChar char="•"/>
+            </a:pPr>
+            <a:r>
+              <a:rPr lang="en-US" dirty="0">
+                <a:latin typeface="Agency FB Black Condensed"/>
+              </a:rPr>
+              <a:t>Gradient Boosting</a:t>
+            </a:r>
+          </a:p>
+          <a:p>
+            <a:pPr marL="800100" lvl="1" algn="just">
+              <a:lnSpc>
+                <a:spcPct val="150000"/>
+              </a:lnSpc>
+              <a:spcBef>
+                <a:spcPts val="0"/>
+              </a:spcBef>
+              <a:buSzPts val="2800"/>
+              <a:buFont typeface="Arial" panose="020B0604020202020204" pitchFamily="34" charset="0"/>
+              <a:buChar char="•"/>
+            </a:pPr>
+            <a:r>
+              <a:rPr lang="en-US" dirty="0">
+                <a:latin typeface="Agency FB Black Condensed"/>
+              </a:rPr>
+              <a:t>Light Gradient Boosting Machine</a:t>
             </a:r>
           </a:p>
           <a:p>
@@ -15933,11 +16326,11 @@
               <a:rPr lang="en-US" sz="2400" b="1" dirty="0">
                 <a:latin typeface="Agency FB Black Condensed"/>
               </a:rPr>
-              <a:t>Accuracy vs speed</a:t>
+              <a:t>Regressions:</a:t>
             </a:r>
           </a:p>
           <a:p>
-            <a:pPr marL="342900" algn="just">
+            <a:pPr marL="800100" lvl="1" algn="just">
               <a:lnSpc>
                 <a:spcPct val="150000"/>
               </a:lnSpc>
@@ -15949,14 +16342,14 @@
               <a:buChar char="•"/>
             </a:pPr>
             <a:r>
-              <a:rPr lang="en-US" sz="2400" b="1" dirty="0">
+              <a:rPr lang="en-US" dirty="0">
                 <a:latin typeface="Agency FB Black Condensed"/>
               </a:rPr>
-              <a:t>Limitations</a:t>
+              <a:t>Linear Regression</a:t>
             </a:r>
           </a:p>
           <a:p>
-            <a:pPr marL="342900" algn="just">
+            <a:pPr marL="800100" lvl="1" algn="just">
               <a:lnSpc>
                 <a:spcPct val="150000"/>
               </a:lnSpc>
@@ -15968,14 +16361,14 @@
               <a:buChar char="•"/>
             </a:pPr>
             <a:r>
-              <a:rPr lang="en-US" sz="2400" b="1" dirty="0">
+              <a:rPr lang="en-US" dirty="0">
                 <a:latin typeface="Agency FB Black Condensed"/>
               </a:rPr>
-              <a:t>Else</a:t>
+              <a:t>Ridge Regression</a:t>
             </a:r>
           </a:p>
           <a:p>
-            <a:pPr marL="342900" algn="just">
+            <a:pPr marL="800100" lvl="1" algn="just">
               <a:lnSpc>
                 <a:spcPct val="150000"/>
               </a:lnSpc>
@@ -16213,7 +16606,7 @@
     </p:spTree>
     <p:extLst>
       <p:ext uri="{BB962C8B-B14F-4D97-AF65-F5344CB8AC3E}">
-        <p14:creationId xmlns:p14="http://schemas.microsoft.com/office/powerpoint/2010/main" val="3697411214"/>
+        <p14:creationId xmlns:p14="http://schemas.microsoft.com/office/powerpoint/2010/main" val="3176474029"/>
       </p:ext>
     </p:extLst>
   </p:cSld>
@@ -16289,9 +16682,11 @@
             <a:r>
               <a:rPr lang="en-US" b="1" dirty="0">
                 <a:latin typeface="Agency FB Black Condensed"/>
+                <a:ea typeface="Garamond"/>
+                <a:cs typeface="Garamond"/>
                 <a:sym typeface="Garamond"/>
               </a:rPr>
-              <a:t>Advanced Analysis </a:t>
+              <a:t>Explain each model per slide</a:t>
             </a:r>
             <a:endParaRPr dirty="0">
               <a:latin typeface="Agency FB Black Condensed"/>
@@ -16340,10 +16735,10 @@
               <a:buChar char="•"/>
             </a:pPr>
             <a:r>
-              <a:rPr lang="en-US" dirty="0">
+              <a:rPr lang="en-US" sz="2400" b="1" dirty="0">
                 <a:latin typeface="Agency FB Black Condensed"/>
               </a:rPr>
-              <a:t>Mike’s ideas</a:t>
+              <a:t>Metrics</a:t>
             </a:r>
           </a:p>
           <a:p>
@@ -16359,11 +16754,65 @@
               <a:buChar char="•"/>
             </a:pPr>
             <a:r>
-              <a:rPr lang="en-US" dirty="0">
+              <a:rPr lang="en-US" sz="2400" b="1" dirty="0">
                 <a:latin typeface="Agency FB Black Condensed"/>
               </a:rPr>
-              <a:t>Implementation</a:t>
+              <a:t>Accuracy vs speed</a:t>
             </a:r>
+          </a:p>
+          <a:p>
+            <a:pPr marL="342900" algn="just">
+              <a:lnSpc>
+                <a:spcPct val="150000"/>
+              </a:lnSpc>
+              <a:spcBef>
+                <a:spcPts val="0"/>
+              </a:spcBef>
+              <a:buSzPts val="2800"/>
+              <a:buFont typeface="Arial" panose="020B0604020202020204" pitchFamily="34" charset="0"/>
+              <a:buChar char="•"/>
+            </a:pPr>
+            <a:r>
+              <a:rPr lang="en-US" sz="2400" b="1" dirty="0">
+                <a:latin typeface="Agency FB Black Condensed"/>
+              </a:rPr>
+              <a:t>Limitations</a:t>
+            </a:r>
+          </a:p>
+          <a:p>
+            <a:pPr marL="342900" algn="just">
+              <a:lnSpc>
+                <a:spcPct val="150000"/>
+              </a:lnSpc>
+              <a:spcBef>
+                <a:spcPts val="0"/>
+              </a:spcBef>
+              <a:buSzPts val="2800"/>
+              <a:buFont typeface="Arial" panose="020B0604020202020204" pitchFamily="34" charset="0"/>
+              <a:buChar char="•"/>
+            </a:pPr>
+            <a:r>
+              <a:rPr lang="en-US" sz="2400" b="1" dirty="0">
+                <a:latin typeface="Agency FB Black Condensed"/>
+              </a:rPr>
+              <a:t>Else</a:t>
+            </a:r>
+          </a:p>
+          <a:p>
+            <a:pPr marL="342900" algn="just">
+              <a:lnSpc>
+                <a:spcPct val="150000"/>
+              </a:lnSpc>
+              <a:spcBef>
+                <a:spcPts val="0"/>
+              </a:spcBef>
+              <a:buSzPts val="2800"/>
+              <a:buFont typeface="Arial" panose="020B0604020202020204" pitchFamily="34" charset="0"/>
+              <a:buChar char="•"/>
+            </a:pPr>
+            <a:endParaRPr lang="en-US" dirty="0">
+              <a:latin typeface="Agency FB Black Condensed"/>
+            </a:endParaRPr>
           </a:p>
           <a:p>
             <a:pPr marL="800100" lvl="1" algn="just">
@@ -16588,7 +17037,7 @@
     </p:spTree>
     <p:extLst>
       <p:ext uri="{BB962C8B-B14F-4D97-AF65-F5344CB8AC3E}">
-        <p14:creationId xmlns:p14="http://schemas.microsoft.com/office/powerpoint/2010/main" val="2693520062"/>
+        <p14:creationId xmlns:p14="http://schemas.microsoft.com/office/powerpoint/2010/main" val="3697411214"/>
       </p:ext>
     </p:extLst>
   </p:cSld>
@@ -16664,11 +17113,9 @@
             <a:r>
               <a:rPr lang="en-US" b="1" dirty="0">
                 <a:latin typeface="Agency FB Black Condensed"/>
-                <a:ea typeface="Garamond"/>
-                <a:cs typeface="Garamond"/>
                 <a:sym typeface="Garamond"/>
               </a:rPr>
-              <a:t>Neural networks</a:t>
+              <a:t>Advanced Analysis </a:t>
             </a:r>
             <a:endParaRPr dirty="0">
               <a:latin typeface="Agency FB Black Condensed"/>
@@ -16716,9 +17163,31 @@
               <a:buFont typeface="Arial" panose="020B0604020202020204" pitchFamily="34" charset="0"/>
               <a:buChar char="•"/>
             </a:pPr>
-            <a:endParaRPr lang="en-US" dirty="0">
-              <a:latin typeface="Agency FB Black Condensed"/>
-            </a:endParaRPr>
+            <a:r>
+              <a:rPr lang="en-US" dirty="0">
+                <a:latin typeface="Agency FB Black Condensed"/>
+              </a:rPr>
+              <a:t>Mike’s ideas</a:t>
+            </a:r>
+          </a:p>
+          <a:p>
+            <a:pPr marL="342900" algn="just">
+              <a:lnSpc>
+                <a:spcPct val="150000"/>
+              </a:lnSpc>
+              <a:spcBef>
+                <a:spcPts val="0"/>
+              </a:spcBef>
+              <a:buSzPts val="2800"/>
+              <a:buFont typeface="Arial" panose="020B0604020202020204" pitchFamily="34" charset="0"/>
+              <a:buChar char="•"/>
+            </a:pPr>
+            <a:r>
+              <a:rPr lang="en-US" dirty="0">
+                <a:latin typeface="Agency FB Black Condensed"/>
+              </a:rPr>
+              <a:t>Implementation</a:t>
+            </a:r>
           </a:p>
           <a:p>
             <a:pPr marL="800100" lvl="1" algn="just">
@@ -16943,7 +17412,7 @@
     </p:spTree>
     <p:extLst>
       <p:ext uri="{BB962C8B-B14F-4D97-AF65-F5344CB8AC3E}">
-        <p14:creationId xmlns:p14="http://schemas.microsoft.com/office/powerpoint/2010/main" val="1721007729"/>
+        <p14:creationId xmlns:p14="http://schemas.microsoft.com/office/powerpoint/2010/main" val="2693520062"/>
       </p:ext>
     </p:extLst>
   </p:cSld>
@@ -17021,7 +17490,7 @@
                 <a:latin typeface="Agency FB Black Condensed"/>
                 <a:sym typeface="Garamond"/>
               </a:rPr>
-              <a:t>Sources</a:t>
+              <a:t>PCA analysis</a:t>
             </a:r>
             <a:endParaRPr dirty="0">
               <a:latin typeface="Agency FB Black Condensed"/>
@@ -17073,26 +17542,7 @@
               <a:rPr lang="en-US" dirty="0">
                 <a:latin typeface="Agency FB Black Condensed"/>
               </a:rPr>
-              <a:t>Mike’s ideas</a:t>
-            </a:r>
-          </a:p>
-          <a:p>
-            <a:pPr marL="342900" algn="just">
-              <a:lnSpc>
-                <a:spcPct val="150000"/>
-              </a:lnSpc>
-              <a:spcBef>
-                <a:spcPts val="0"/>
-              </a:spcBef>
-              <a:buSzPts val="2800"/>
-              <a:buFont typeface="Arial" panose="020B0604020202020204" pitchFamily="34" charset="0"/>
-              <a:buChar char="•"/>
-            </a:pPr>
-            <a:r>
-              <a:rPr lang="en-US" dirty="0">
-                <a:latin typeface="Agency FB Black Condensed"/>
-              </a:rPr>
-              <a:t>Implementation</a:t>
+              <a:t>Serena might take a look here</a:t>
             </a:r>
           </a:p>
           <a:p>
@@ -17318,7 +17768,7 @@
     </p:spTree>
     <p:extLst>
       <p:ext uri="{BB962C8B-B14F-4D97-AF65-F5344CB8AC3E}">
-        <p14:creationId xmlns:p14="http://schemas.microsoft.com/office/powerpoint/2010/main" val="2029746287"/>
+        <p14:creationId xmlns:p14="http://schemas.microsoft.com/office/powerpoint/2010/main" val="1223726834"/>
       </p:ext>
     </p:extLst>
   </p:cSld>
@@ -17394,9 +17844,11 @@
             <a:r>
               <a:rPr lang="en-US" b="1" dirty="0">
                 <a:latin typeface="Agency FB Black Condensed"/>
+                <a:ea typeface="Garamond"/>
+                <a:cs typeface="Garamond"/>
                 <a:sym typeface="Garamond"/>
               </a:rPr>
-              <a:t>Future work</a:t>
+              <a:t>Neural networks</a:t>
             </a:r>
             <a:endParaRPr dirty="0">
               <a:latin typeface="Agency FB Black Condensed"/>
@@ -17448,6 +17900,775 @@
               <a:rPr lang="en-US" dirty="0">
                 <a:latin typeface="Agency FB Black Condensed"/>
               </a:rPr>
+              <a:t>4 simple NNs (TBD)</a:t>
+            </a:r>
+          </a:p>
+          <a:p>
+            <a:pPr marL="342900" algn="just">
+              <a:lnSpc>
+                <a:spcPct val="150000"/>
+              </a:lnSpc>
+              <a:spcBef>
+                <a:spcPts val="0"/>
+              </a:spcBef>
+              <a:buSzPts val="2800"/>
+              <a:buFont typeface="Arial" panose="020B0604020202020204" pitchFamily="34" charset="0"/>
+              <a:buChar char="•"/>
+            </a:pPr>
+            <a:r>
+              <a:rPr lang="en-US" dirty="0">
+                <a:latin typeface="Agency FB Black Condensed"/>
+              </a:rPr>
+              <a:t>Explain advantages and disadvantages</a:t>
+            </a:r>
+          </a:p>
+          <a:p>
+            <a:pPr marL="342900" algn="just">
+              <a:lnSpc>
+                <a:spcPct val="150000"/>
+              </a:lnSpc>
+              <a:spcBef>
+                <a:spcPts val="0"/>
+              </a:spcBef>
+              <a:buSzPts val="2800"/>
+              <a:buFont typeface="Arial" panose="020B0604020202020204" pitchFamily="34" charset="0"/>
+              <a:buChar char="•"/>
+            </a:pPr>
+            <a:r>
+              <a:rPr lang="en-US" dirty="0">
+                <a:latin typeface="Agency FB Black Condensed"/>
+              </a:rPr>
+              <a:t>Compare metrics vs time</a:t>
+            </a:r>
+          </a:p>
+          <a:p>
+            <a:pPr marL="800100" lvl="1" algn="just">
+              <a:lnSpc>
+                <a:spcPct val="150000"/>
+              </a:lnSpc>
+              <a:spcBef>
+                <a:spcPts val="0"/>
+              </a:spcBef>
+              <a:buSzPts val="2800"/>
+              <a:buFont typeface="Arial" panose="020B0604020202020204" pitchFamily="34" charset="0"/>
+              <a:buChar char="•"/>
+            </a:pPr>
+            <a:endParaRPr lang="en-US" sz="2000" dirty="0">
+              <a:latin typeface="Agency FB Black Condensed"/>
+            </a:endParaRPr>
+          </a:p>
+          <a:p>
+            <a:pPr marL="800100" lvl="1" algn="just">
+              <a:lnSpc>
+                <a:spcPct val="150000"/>
+              </a:lnSpc>
+              <a:spcBef>
+                <a:spcPts val="0"/>
+              </a:spcBef>
+              <a:buSzPts val="2800"/>
+              <a:buFont typeface="Arial" panose="020B0604020202020204" pitchFamily="34" charset="0"/>
+              <a:buChar char="•"/>
+            </a:pPr>
+            <a:endParaRPr lang="en-US" sz="2000" dirty="0">
+              <a:latin typeface="Agency FB Black Condensed"/>
+            </a:endParaRPr>
+          </a:p>
+          <a:p>
+            <a:pPr marL="800100" lvl="1" algn="just">
+              <a:lnSpc>
+                <a:spcPct val="150000"/>
+              </a:lnSpc>
+              <a:spcBef>
+                <a:spcPts val="0"/>
+              </a:spcBef>
+              <a:buSzPts val="2800"/>
+              <a:buFont typeface="Arial" panose="020B0604020202020204" pitchFamily="34" charset="0"/>
+              <a:buChar char="•"/>
+            </a:pPr>
+            <a:endParaRPr lang="en-US" sz="2000" dirty="0">
+              <a:latin typeface="Agency FB Black Condensed"/>
+            </a:endParaRPr>
+          </a:p>
+          <a:p>
+            <a:pPr marL="800100" lvl="1" algn="just">
+              <a:lnSpc>
+                <a:spcPct val="150000"/>
+              </a:lnSpc>
+              <a:spcBef>
+                <a:spcPts val="0"/>
+              </a:spcBef>
+              <a:buSzPts val="2800"/>
+              <a:buFont typeface="Arial" panose="020B0604020202020204" pitchFamily="34" charset="0"/>
+              <a:buChar char="•"/>
+            </a:pPr>
+            <a:endParaRPr lang="en-US" sz="2000" dirty="0">
+              <a:latin typeface="Agency FB Black Condensed"/>
+            </a:endParaRPr>
+          </a:p>
+          <a:p>
+            <a:pPr marL="800100" lvl="1" algn="just">
+              <a:lnSpc>
+                <a:spcPct val="150000"/>
+              </a:lnSpc>
+              <a:spcBef>
+                <a:spcPts val="0"/>
+              </a:spcBef>
+              <a:buSzPts val="2800"/>
+              <a:buFont typeface="Arial" panose="020B0604020202020204" pitchFamily="34" charset="0"/>
+              <a:buChar char="•"/>
+            </a:pPr>
+            <a:endParaRPr lang="en-US" sz="2000" dirty="0">
+              <a:latin typeface="Agency FB Black Condensed"/>
+            </a:endParaRPr>
+          </a:p>
+          <a:p>
+            <a:pPr marL="800100" lvl="1" algn="just">
+              <a:lnSpc>
+                <a:spcPct val="150000"/>
+              </a:lnSpc>
+              <a:spcBef>
+                <a:spcPts val="0"/>
+              </a:spcBef>
+              <a:buSzPts val="2800"/>
+              <a:buFont typeface="Arial" panose="020B0604020202020204" pitchFamily="34" charset="0"/>
+              <a:buChar char="•"/>
+            </a:pPr>
+            <a:endParaRPr lang="en-US" sz="2000" dirty="0">
+              <a:latin typeface="Agency FB Black Condensed"/>
+            </a:endParaRPr>
+          </a:p>
+          <a:p>
+            <a:pPr marL="800100" lvl="1" algn="just">
+              <a:lnSpc>
+                <a:spcPct val="150000"/>
+              </a:lnSpc>
+              <a:spcBef>
+                <a:spcPts val="0"/>
+              </a:spcBef>
+              <a:buSzPts val="2800"/>
+              <a:buFont typeface="Arial" panose="020B0604020202020204" pitchFamily="34" charset="0"/>
+              <a:buChar char="•"/>
+            </a:pPr>
+            <a:endParaRPr lang="en-US" sz="2000" dirty="0">
+              <a:latin typeface="Agency FB Black Condensed"/>
+            </a:endParaRPr>
+          </a:p>
+          <a:p>
+            <a:pPr marL="800100" lvl="1" algn="just">
+              <a:lnSpc>
+                <a:spcPct val="150000"/>
+              </a:lnSpc>
+              <a:spcBef>
+                <a:spcPts val="0"/>
+              </a:spcBef>
+              <a:buSzPts val="2800"/>
+              <a:buFont typeface="Arial" panose="020B0604020202020204" pitchFamily="34" charset="0"/>
+              <a:buChar char="•"/>
+            </a:pPr>
+            <a:endParaRPr lang="en-US" sz="2000" dirty="0">
+              <a:latin typeface="Agency FB Black Condensed"/>
+            </a:endParaRPr>
+          </a:p>
+          <a:p>
+            <a:pPr marL="342900" algn="just">
+              <a:lnSpc>
+                <a:spcPct val="150000"/>
+              </a:lnSpc>
+              <a:spcBef>
+                <a:spcPts val="0"/>
+              </a:spcBef>
+              <a:buSzPts val="2800"/>
+              <a:buFont typeface="Arial" panose="020B0604020202020204" pitchFamily="34" charset="0"/>
+              <a:buChar char="•"/>
+            </a:pPr>
+            <a:endParaRPr lang="en-US" sz="2400" dirty="0">
+              <a:latin typeface="Agency FB Black Condensed"/>
+            </a:endParaRPr>
+          </a:p>
+          <a:p>
+            <a:pPr marL="342900" algn="just">
+              <a:lnSpc>
+                <a:spcPct val="150000"/>
+              </a:lnSpc>
+              <a:spcBef>
+                <a:spcPts val="0"/>
+              </a:spcBef>
+              <a:buSzPts val="2800"/>
+              <a:buFont typeface="Arial" panose="020B0604020202020204" pitchFamily="34" charset="0"/>
+              <a:buChar char="•"/>
+            </a:pPr>
+            <a:endParaRPr lang="en-US" dirty="0">
+              <a:latin typeface="Agency FB Black Condensed"/>
+            </a:endParaRPr>
+          </a:p>
+          <a:p>
+            <a:pPr marL="800100" lvl="1" algn="just">
+              <a:lnSpc>
+                <a:spcPct val="100000"/>
+              </a:lnSpc>
+              <a:spcBef>
+                <a:spcPts val="0"/>
+              </a:spcBef>
+              <a:buSzPts val="2800"/>
+              <a:buFont typeface="Arial" panose="020B0604020202020204" pitchFamily="34" charset="0"/>
+              <a:buChar char="•"/>
+            </a:pPr>
+            <a:endParaRPr lang="en-US" sz="2000" dirty="0">
+              <a:latin typeface="Agency FB Black Condensed"/>
+            </a:endParaRPr>
+          </a:p>
+          <a:p>
+            <a:pPr indent="-457200" algn="just">
+              <a:lnSpc>
+                <a:spcPct val="150000"/>
+              </a:lnSpc>
+              <a:spcBef>
+                <a:spcPts val="0"/>
+              </a:spcBef>
+              <a:buSzPts val="2800"/>
+            </a:pPr>
+            <a:endParaRPr lang="en-US" sz="2400" dirty="0">
+              <a:latin typeface="Agency FB Black Condensed"/>
+            </a:endParaRPr>
+          </a:p>
+          <a:p>
+            <a:pPr indent="-457200" algn="just">
+              <a:lnSpc>
+                <a:spcPct val="150000"/>
+              </a:lnSpc>
+              <a:spcBef>
+                <a:spcPts val="0"/>
+              </a:spcBef>
+              <a:buSzPts val="2800"/>
+            </a:pPr>
+            <a:endParaRPr lang="en-US" sz="2400" dirty="0">
+              <a:latin typeface="Agency FB Black Condensed"/>
+            </a:endParaRPr>
+          </a:p>
+          <a:p>
+            <a:pPr indent="-457200" algn="just">
+              <a:lnSpc>
+                <a:spcPct val="150000"/>
+              </a:lnSpc>
+              <a:spcBef>
+                <a:spcPts val="0"/>
+              </a:spcBef>
+              <a:buSzPts val="2800"/>
+            </a:pPr>
+            <a:endParaRPr lang="en-US" sz="2400" b="1" dirty="0">
+              <a:latin typeface="Agency FB Black Condensed"/>
+            </a:endParaRPr>
+          </a:p>
+        </p:txBody>
+      </p:sp>
+    </p:spTree>
+    <p:extLst>
+      <p:ext uri="{BB962C8B-B14F-4D97-AF65-F5344CB8AC3E}">
+        <p14:creationId xmlns:p14="http://schemas.microsoft.com/office/powerpoint/2010/main" val="1721007729"/>
+      </p:ext>
+    </p:extLst>
+  </p:cSld>
+  <p:clrMapOvr>
+    <a:masterClrMapping/>
+  </p:clrMapOvr>
+</p:sld>
+</file>
+
+<file path=ppt/slides/slide18.xml><?xml version="1.0" encoding="utf-8"?>
+<p:sld xmlns:a="http://schemas.openxmlformats.org/drawingml/2006/main" xmlns:r="http://schemas.openxmlformats.org/officeDocument/2006/relationships" xmlns:p="http://schemas.openxmlformats.org/presentationml/2006/main">
+  <p:cSld>
+    <p:spTree>
+      <p:nvGrpSpPr>
+        <p:cNvPr id="1" name="Shape 117"/>
+        <p:cNvGrpSpPr/>
+        <p:nvPr/>
+      </p:nvGrpSpPr>
+      <p:grpSpPr>
+        <a:xfrm>
+          <a:off x="0" y="0"/>
+          <a:ext cx="0" cy="0"/>
+          <a:chOff x="0" y="0"/>
+          <a:chExt cx="0" cy="0"/>
+        </a:xfrm>
+      </p:grpSpPr>
+      <p:sp>
+        <p:nvSpPr>
+          <p:cNvPr id="118" name="Google Shape;118;p4"/>
+          <p:cNvSpPr txBox="1">
+            <a:spLocks noGrp="1"/>
+          </p:cNvSpPr>
+          <p:nvPr>
+            <p:ph type="title"/>
+          </p:nvPr>
+        </p:nvSpPr>
+        <p:spPr>
+          <a:xfrm>
+            <a:off x="838200" y="365125"/>
+            <a:ext cx="10515600" cy="1325563"/>
+          </a:xfrm>
+          <a:prstGeom prst="rect">
+            <a:avLst/>
+          </a:prstGeom>
+          <a:noFill/>
+          <a:ln>
+            <a:noFill/>
+          </a:ln>
+        </p:spPr>
+        <p:txBody>
+          <a:bodyPr spcFirstLastPara="1" wrap="square" lIns="91425" tIns="45700" rIns="91425" bIns="45700" anchor="ctr" anchorCtr="0">
+            <a:normAutofit/>
+          </a:bodyPr>
+          <a:lstStyle/>
+          <a:p>
+            <a:pPr marL="0" lvl="0" indent="0" algn="l" rtl="0">
+              <a:lnSpc>
+                <a:spcPct val="90000"/>
+              </a:lnSpc>
+              <a:spcBef>
+                <a:spcPts val="0"/>
+              </a:spcBef>
+              <a:spcAft>
+                <a:spcPts val="0"/>
+              </a:spcAft>
+              <a:buClr>
+                <a:schemeClr val="dk1"/>
+              </a:buClr>
+              <a:buSzPts val="4400"/>
+              <a:buFont typeface="Garamond"/>
+              <a:buNone/>
+            </a:pPr>
+            <a:r>
+              <a:rPr lang="en-US" b="1" dirty="0">
+                <a:latin typeface="Agency FB Black Condensed"/>
+                <a:sym typeface="Garamond"/>
+              </a:rPr>
+              <a:t>Sources</a:t>
+            </a:r>
+            <a:endParaRPr dirty="0">
+              <a:latin typeface="Agency FB Black Condensed"/>
+            </a:endParaRPr>
+          </a:p>
+        </p:txBody>
+      </p:sp>
+      <p:sp>
+        <p:nvSpPr>
+          <p:cNvPr id="119" name="Google Shape;119;p4"/>
+          <p:cNvSpPr txBox="1">
+            <a:spLocks noGrp="1"/>
+          </p:cNvSpPr>
+          <p:nvPr>
+            <p:ph type="body" idx="1"/>
+          </p:nvPr>
+        </p:nvSpPr>
+        <p:spPr>
+          <a:xfrm>
+            <a:off x="838200" y="1828801"/>
+            <a:ext cx="10317480" cy="3908868"/>
+          </a:xfrm>
+          <a:prstGeom prst="rect">
+            <a:avLst/>
+          </a:prstGeom>
+          <a:noFill/>
+          <a:ln>
+            <a:noFill/>
+          </a:ln>
+        </p:spPr>
+        <p:txBody>
+          <a:bodyPr spcFirstLastPara="1" wrap="square" lIns="91425" tIns="45700" rIns="91425" bIns="45700" anchor="t" anchorCtr="0">
+            <a:noAutofit/>
+          </a:bodyPr>
+          <a:lstStyle/>
+          <a:p>
+            <a:pPr marL="342900" algn="just">
+              <a:lnSpc>
+                <a:spcPct val="150000"/>
+              </a:lnSpc>
+              <a:spcBef>
+                <a:spcPts val="0"/>
+              </a:spcBef>
+              <a:buSzPts val="2800"/>
+              <a:buFont typeface="Arial" panose="020B0604020202020204" pitchFamily="34" charset="0"/>
+              <a:buChar char="•"/>
+            </a:pPr>
+            <a:r>
+              <a:rPr lang="en-US" dirty="0">
+                <a:latin typeface="Agency FB Black Condensed"/>
+              </a:rPr>
+              <a:t>Mike’s ideas</a:t>
+            </a:r>
+          </a:p>
+          <a:p>
+            <a:pPr marL="342900" algn="just">
+              <a:lnSpc>
+                <a:spcPct val="150000"/>
+              </a:lnSpc>
+              <a:spcBef>
+                <a:spcPts val="0"/>
+              </a:spcBef>
+              <a:buSzPts val="2800"/>
+              <a:buFont typeface="Arial" panose="020B0604020202020204" pitchFamily="34" charset="0"/>
+              <a:buChar char="•"/>
+            </a:pPr>
+            <a:r>
+              <a:rPr lang="en-US" dirty="0">
+                <a:latin typeface="Agency FB Black Condensed"/>
+              </a:rPr>
+              <a:t>Implementation</a:t>
+            </a:r>
+          </a:p>
+          <a:p>
+            <a:pPr marL="800100" lvl="1" algn="just">
+              <a:lnSpc>
+                <a:spcPct val="150000"/>
+              </a:lnSpc>
+              <a:spcBef>
+                <a:spcPts val="0"/>
+              </a:spcBef>
+              <a:buSzPts val="2800"/>
+              <a:buFont typeface="Arial" panose="020B0604020202020204" pitchFamily="34" charset="0"/>
+              <a:buChar char="•"/>
+            </a:pPr>
+            <a:endParaRPr lang="en-US" sz="2000" dirty="0">
+              <a:latin typeface="Agency FB Black Condensed"/>
+            </a:endParaRPr>
+          </a:p>
+          <a:p>
+            <a:pPr marL="800100" lvl="1" algn="just">
+              <a:lnSpc>
+                <a:spcPct val="150000"/>
+              </a:lnSpc>
+              <a:spcBef>
+                <a:spcPts val="0"/>
+              </a:spcBef>
+              <a:buSzPts val="2800"/>
+              <a:buFont typeface="Arial" panose="020B0604020202020204" pitchFamily="34" charset="0"/>
+              <a:buChar char="•"/>
+            </a:pPr>
+            <a:endParaRPr lang="en-US" sz="2000" dirty="0">
+              <a:latin typeface="Agency FB Black Condensed"/>
+            </a:endParaRPr>
+          </a:p>
+          <a:p>
+            <a:pPr marL="800100" lvl="1" algn="just">
+              <a:lnSpc>
+                <a:spcPct val="150000"/>
+              </a:lnSpc>
+              <a:spcBef>
+                <a:spcPts val="0"/>
+              </a:spcBef>
+              <a:buSzPts val="2800"/>
+              <a:buFont typeface="Arial" panose="020B0604020202020204" pitchFamily="34" charset="0"/>
+              <a:buChar char="•"/>
+            </a:pPr>
+            <a:endParaRPr lang="en-US" sz="2000" dirty="0">
+              <a:latin typeface="Agency FB Black Condensed"/>
+            </a:endParaRPr>
+          </a:p>
+          <a:p>
+            <a:pPr marL="800100" lvl="1" algn="just">
+              <a:lnSpc>
+                <a:spcPct val="150000"/>
+              </a:lnSpc>
+              <a:spcBef>
+                <a:spcPts val="0"/>
+              </a:spcBef>
+              <a:buSzPts val="2800"/>
+              <a:buFont typeface="Arial" panose="020B0604020202020204" pitchFamily="34" charset="0"/>
+              <a:buChar char="•"/>
+            </a:pPr>
+            <a:endParaRPr lang="en-US" sz="2000" dirty="0">
+              <a:latin typeface="Agency FB Black Condensed"/>
+            </a:endParaRPr>
+          </a:p>
+          <a:p>
+            <a:pPr marL="800100" lvl="1" algn="just">
+              <a:lnSpc>
+                <a:spcPct val="150000"/>
+              </a:lnSpc>
+              <a:spcBef>
+                <a:spcPts val="0"/>
+              </a:spcBef>
+              <a:buSzPts val="2800"/>
+              <a:buFont typeface="Arial" panose="020B0604020202020204" pitchFamily="34" charset="0"/>
+              <a:buChar char="•"/>
+            </a:pPr>
+            <a:endParaRPr lang="en-US" sz="2000" dirty="0">
+              <a:latin typeface="Agency FB Black Condensed"/>
+            </a:endParaRPr>
+          </a:p>
+          <a:p>
+            <a:pPr marL="800100" lvl="1" algn="just">
+              <a:lnSpc>
+                <a:spcPct val="150000"/>
+              </a:lnSpc>
+              <a:spcBef>
+                <a:spcPts val="0"/>
+              </a:spcBef>
+              <a:buSzPts val="2800"/>
+              <a:buFont typeface="Arial" panose="020B0604020202020204" pitchFamily="34" charset="0"/>
+              <a:buChar char="•"/>
+            </a:pPr>
+            <a:endParaRPr lang="en-US" sz="2000" dirty="0">
+              <a:latin typeface="Agency FB Black Condensed"/>
+            </a:endParaRPr>
+          </a:p>
+          <a:p>
+            <a:pPr marL="800100" lvl="1" algn="just">
+              <a:lnSpc>
+                <a:spcPct val="150000"/>
+              </a:lnSpc>
+              <a:spcBef>
+                <a:spcPts val="0"/>
+              </a:spcBef>
+              <a:buSzPts val="2800"/>
+              <a:buFont typeface="Arial" panose="020B0604020202020204" pitchFamily="34" charset="0"/>
+              <a:buChar char="•"/>
+            </a:pPr>
+            <a:endParaRPr lang="en-US" sz="2000" dirty="0">
+              <a:latin typeface="Agency FB Black Condensed"/>
+            </a:endParaRPr>
+          </a:p>
+          <a:p>
+            <a:pPr marL="800100" lvl="1" algn="just">
+              <a:lnSpc>
+                <a:spcPct val="150000"/>
+              </a:lnSpc>
+              <a:spcBef>
+                <a:spcPts val="0"/>
+              </a:spcBef>
+              <a:buSzPts val="2800"/>
+              <a:buFont typeface="Arial" panose="020B0604020202020204" pitchFamily="34" charset="0"/>
+              <a:buChar char="•"/>
+            </a:pPr>
+            <a:endParaRPr lang="en-US" sz="2000" dirty="0">
+              <a:latin typeface="Agency FB Black Condensed"/>
+            </a:endParaRPr>
+          </a:p>
+          <a:p>
+            <a:pPr marL="342900" algn="just">
+              <a:lnSpc>
+                <a:spcPct val="150000"/>
+              </a:lnSpc>
+              <a:spcBef>
+                <a:spcPts val="0"/>
+              </a:spcBef>
+              <a:buSzPts val="2800"/>
+              <a:buFont typeface="Arial" panose="020B0604020202020204" pitchFamily="34" charset="0"/>
+              <a:buChar char="•"/>
+            </a:pPr>
+            <a:endParaRPr lang="en-US" sz="2400" dirty="0">
+              <a:latin typeface="Agency FB Black Condensed"/>
+            </a:endParaRPr>
+          </a:p>
+          <a:p>
+            <a:pPr marL="342900" algn="just">
+              <a:lnSpc>
+                <a:spcPct val="150000"/>
+              </a:lnSpc>
+              <a:spcBef>
+                <a:spcPts val="0"/>
+              </a:spcBef>
+              <a:buSzPts val="2800"/>
+              <a:buFont typeface="Arial" panose="020B0604020202020204" pitchFamily="34" charset="0"/>
+              <a:buChar char="•"/>
+            </a:pPr>
+            <a:endParaRPr lang="en-US" dirty="0">
+              <a:latin typeface="Agency FB Black Condensed"/>
+            </a:endParaRPr>
+          </a:p>
+          <a:p>
+            <a:pPr marL="800100" lvl="1" algn="just">
+              <a:lnSpc>
+                <a:spcPct val="100000"/>
+              </a:lnSpc>
+              <a:spcBef>
+                <a:spcPts val="0"/>
+              </a:spcBef>
+              <a:buSzPts val="2800"/>
+              <a:buFont typeface="Arial" panose="020B0604020202020204" pitchFamily="34" charset="0"/>
+              <a:buChar char="•"/>
+            </a:pPr>
+            <a:endParaRPr lang="en-US" sz="2000" dirty="0">
+              <a:latin typeface="Agency FB Black Condensed"/>
+            </a:endParaRPr>
+          </a:p>
+          <a:p>
+            <a:pPr indent="-457200" algn="just">
+              <a:lnSpc>
+                <a:spcPct val="150000"/>
+              </a:lnSpc>
+              <a:spcBef>
+                <a:spcPts val="0"/>
+              </a:spcBef>
+              <a:buSzPts val="2800"/>
+            </a:pPr>
+            <a:endParaRPr lang="en-US" sz="2400" dirty="0">
+              <a:latin typeface="Agency FB Black Condensed"/>
+            </a:endParaRPr>
+          </a:p>
+          <a:p>
+            <a:pPr indent="-457200" algn="just">
+              <a:lnSpc>
+                <a:spcPct val="150000"/>
+              </a:lnSpc>
+              <a:spcBef>
+                <a:spcPts val="0"/>
+              </a:spcBef>
+              <a:buSzPts val="2800"/>
+            </a:pPr>
+            <a:endParaRPr lang="en-US" sz="2400" dirty="0">
+              <a:latin typeface="Agency FB Black Condensed"/>
+            </a:endParaRPr>
+          </a:p>
+          <a:p>
+            <a:pPr indent="-457200" algn="just">
+              <a:lnSpc>
+                <a:spcPct val="150000"/>
+              </a:lnSpc>
+              <a:spcBef>
+                <a:spcPts val="0"/>
+              </a:spcBef>
+              <a:buSzPts val="2800"/>
+            </a:pPr>
+            <a:endParaRPr lang="en-US" sz="2400" b="1" dirty="0">
+              <a:latin typeface="Agency FB Black Condensed"/>
+            </a:endParaRPr>
+          </a:p>
+        </p:txBody>
+      </p:sp>
+    </p:spTree>
+    <p:extLst>
+      <p:ext uri="{BB962C8B-B14F-4D97-AF65-F5344CB8AC3E}">
+        <p14:creationId xmlns:p14="http://schemas.microsoft.com/office/powerpoint/2010/main" val="2029746287"/>
+      </p:ext>
+    </p:extLst>
+  </p:cSld>
+  <p:clrMapOvr>
+    <a:masterClrMapping/>
+  </p:clrMapOvr>
+</p:sld>
+</file>
+
+<file path=ppt/slides/slide19.xml><?xml version="1.0" encoding="utf-8"?>
+<p:sld xmlns:a="http://schemas.openxmlformats.org/drawingml/2006/main" xmlns:r="http://schemas.openxmlformats.org/officeDocument/2006/relationships" xmlns:p="http://schemas.openxmlformats.org/presentationml/2006/main">
+  <p:cSld>
+    <p:spTree>
+      <p:nvGrpSpPr>
+        <p:cNvPr id="1" name="Shape 117"/>
+        <p:cNvGrpSpPr/>
+        <p:nvPr/>
+      </p:nvGrpSpPr>
+      <p:grpSpPr>
+        <a:xfrm>
+          <a:off x="0" y="0"/>
+          <a:ext cx="0" cy="0"/>
+          <a:chOff x="0" y="0"/>
+          <a:chExt cx="0" cy="0"/>
+        </a:xfrm>
+      </p:grpSpPr>
+      <p:sp>
+        <p:nvSpPr>
+          <p:cNvPr id="118" name="Google Shape;118;p4"/>
+          <p:cNvSpPr txBox="1">
+            <a:spLocks noGrp="1"/>
+          </p:cNvSpPr>
+          <p:nvPr>
+            <p:ph type="title"/>
+          </p:nvPr>
+        </p:nvSpPr>
+        <p:spPr>
+          <a:xfrm>
+            <a:off x="838200" y="365125"/>
+            <a:ext cx="10515600" cy="1325563"/>
+          </a:xfrm>
+          <a:prstGeom prst="rect">
+            <a:avLst/>
+          </a:prstGeom>
+          <a:noFill/>
+          <a:ln>
+            <a:noFill/>
+          </a:ln>
+        </p:spPr>
+        <p:txBody>
+          <a:bodyPr spcFirstLastPara="1" wrap="square" lIns="91425" tIns="45700" rIns="91425" bIns="45700" anchor="ctr" anchorCtr="0">
+            <a:normAutofit/>
+          </a:bodyPr>
+          <a:lstStyle/>
+          <a:p>
+            <a:pPr marL="0" lvl="0" indent="0" algn="l" rtl="0">
+              <a:lnSpc>
+                <a:spcPct val="90000"/>
+              </a:lnSpc>
+              <a:spcBef>
+                <a:spcPts val="0"/>
+              </a:spcBef>
+              <a:spcAft>
+                <a:spcPts val="0"/>
+              </a:spcAft>
+              <a:buClr>
+                <a:schemeClr val="dk1"/>
+              </a:buClr>
+              <a:buSzPts val="4400"/>
+              <a:buFont typeface="Garamond"/>
+              <a:buNone/>
+            </a:pPr>
+            <a:r>
+              <a:rPr lang="en-US" b="1" dirty="0">
+                <a:latin typeface="Agency FB Black Condensed"/>
+                <a:sym typeface="Garamond"/>
+              </a:rPr>
+              <a:t>Future work</a:t>
+            </a:r>
+            <a:endParaRPr dirty="0">
+              <a:latin typeface="Agency FB Black Condensed"/>
+            </a:endParaRPr>
+          </a:p>
+        </p:txBody>
+      </p:sp>
+      <p:sp>
+        <p:nvSpPr>
+          <p:cNvPr id="119" name="Google Shape;119;p4"/>
+          <p:cNvSpPr txBox="1">
+            <a:spLocks noGrp="1"/>
+          </p:cNvSpPr>
+          <p:nvPr>
+            <p:ph type="body" idx="1"/>
+          </p:nvPr>
+        </p:nvSpPr>
+        <p:spPr>
+          <a:xfrm>
+            <a:off x="838200" y="1828801"/>
+            <a:ext cx="10317480" cy="3908868"/>
+          </a:xfrm>
+          <a:prstGeom prst="rect">
+            <a:avLst/>
+          </a:prstGeom>
+          <a:noFill/>
+          <a:ln>
+            <a:noFill/>
+          </a:ln>
+        </p:spPr>
+        <p:txBody>
+          <a:bodyPr spcFirstLastPara="1" wrap="square" lIns="91425" tIns="45700" rIns="91425" bIns="45700" anchor="t" anchorCtr="0">
+            <a:noAutofit/>
+          </a:bodyPr>
+          <a:lstStyle/>
+          <a:p>
+            <a:pPr marL="342900" algn="just">
+              <a:lnSpc>
+                <a:spcPct val="150000"/>
+              </a:lnSpc>
+              <a:spcBef>
+                <a:spcPts val="0"/>
+              </a:spcBef>
+              <a:buSzPts val="2800"/>
+              <a:buFont typeface="Arial" panose="020B0604020202020204" pitchFamily="34" charset="0"/>
+              <a:buChar char="•"/>
+            </a:pPr>
+            <a:r>
+              <a:rPr lang="en-US" dirty="0">
+                <a:latin typeface="Agency FB Black Condensed"/>
+              </a:rPr>
               <a:t>TBD</a:t>
             </a:r>
           </a:p>
@@ -17699,7 +18920,264 @@
 </p:sld>
 </file>
 
-<file path=ppt/slides/slide18.xml><?xml version="1.0" encoding="utf-8"?>
+<file path=ppt/slides/slide2.xml><?xml version="1.0" encoding="utf-8"?>
+<p:sld xmlns:a="http://schemas.openxmlformats.org/drawingml/2006/main" xmlns:r="http://schemas.openxmlformats.org/officeDocument/2006/relationships" xmlns:p="http://schemas.openxmlformats.org/presentationml/2006/main">
+  <p:cSld>
+    <p:spTree>
+      <p:nvGrpSpPr>
+        <p:cNvPr id="1" name="Shape 117"/>
+        <p:cNvGrpSpPr/>
+        <p:nvPr/>
+      </p:nvGrpSpPr>
+      <p:grpSpPr>
+        <a:xfrm>
+          <a:off x="0" y="0"/>
+          <a:ext cx="0" cy="0"/>
+          <a:chOff x="0" y="0"/>
+          <a:chExt cx="0" cy="0"/>
+        </a:xfrm>
+      </p:grpSpPr>
+      <p:sp>
+        <p:nvSpPr>
+          <p:cNvPr id="118" name="Google Shape;118;p4"/>
+          <p:cNvSpPr txBox="1">
+            <a:spLocks noGrp="1"/>
+          </p:cNvSpPr>
+          <p:nvPr>
+            <p:ph type="title"/>
+          </p:nvPr>
+        </p:nvSpPr>
+        <p:spPr>
+          <a:xfrm>
+            <a:off x="838200" y="365125"/>
+            <a:ext cx="10515600" cy="1325563"/>
+          </a:xfrm>
+          <a:prstGeom prst="rect">
+            <a:avLst/>
+          </a:prstGeom>
+          <a:noFill/>
+          <a:ln>
+            <a:noFill/>
+          </a:ln>
+        </p:spPr>
+        <p:txBody>
+          <a:bodyPr spcFirstLastPara="1" wrap="square" lIns="91425" tIns="45700" rIns="91425" bIns="45700" anchor="ctr" anchorCtr="0">
+            <a:normAutofit/>
+          </a:bodyPr>
+          <a:lstStyle/>
+          <a:p>
+            <a:pPr marL="0" lvl="0" indent="0" algn="l" rtl="0">
+              <a:lnSpc>
+                <a:spcPct val="90000"/>
+              </a:lnSpc>
+              <a:spcBef>
+                <a:spcPts val="0"/>
+              </a:spcBef>
+              <a:spcAft>
+                <a:spcPts val="0"/>
+              </a:spcAft>
+              <a:buClr>
+                <a:schemeClr val="dk1"/>
+              </a:buClr>
+              <a:buSzPts val="4400"/>
+              <a:buFont typeface="Garamond"/>
+              <a:buNone/>
+            </a:pPr>
+            <a:r>
+              <a:rPr lang="en-US" b="1" dirty="0">
+                <a:latin typeface="Agency FB Black Condensed"/>
+                <a:ea typeface="Garamond"/>
+                <a:cs typeface="Garamond"/>
+                <a:sym typeface="Garamond"/>
+              </a:rPr>
+              <a:t>Agenda</a:t>
+            </a:r>
+            <a:endParaRPr dirty="0">
+              <a:latin typeface="Agency FB Black Condensed"/>
+            </a:endParaRPr>
+          </a:p>
+        </p:txBody>
+      </p:sp>
+      <p:sp>
+        <p:nvSpPr>
+          <p:cNvPr id="119" name="Google Shape;119;p4"/>
+          <p:cNvSpPr txBox="1">
+            <a:spLocks noGrp="1"/>
+          </p:cNvSpPr>
+          <p:nvPr>
+            <p:ph type="body" idx="1"/>
+          </p:nvPr>
+        </p:nvSpPr>
+        <p:spPr>
+          <a:xfrm>
+            <a:off x="838200" y="1828801"/>
+            <a:ext cx="10317480" cy="3908868"/>
+          </a:xfrm>
+          <a:prstGeom prst="rect">
+            <a:avLst/>
+          </a:prstGeom>
+          <a:noFill/>
+          <a:ln>
+            <a:noFill/>
+          </a:ln>
+        </p:spPr>
+        <p:txBody>
+          <a:bodyPr spcFirstLastPara="1" wrap="square" lIns="91425" tIns="45700" rIns="91425" bIns="45700" anchor="t" anchorCtr="0">
+            <a:noAutofit/>
+          </a:bodyPr>
+          <a:lstStyle/>
+          <a:p>
+            <a:pPr indent="-457200" algn="just">
+              <a:lnSpc>
+                <a:spcPct val="150000"/>
+              </a:lnSpc>
+              <a:spcBef>
+                <a:spcPts val="0"/>
+              </a:spcBef>
+              <a:buSzPts val="2800"/>
+            </a:pPr>
+            <a:r>
+              <a:rPr lang="en-US" sz="2400" dirty="0">
+                <a:latin typeface="Agency FB Black Condensed"/>
+              </a:rPr>
+              <a:t>Background/Problem Statement</a:t>
+            </a:r>
+          </a:p>
+          <a:p>
+            <a:pPr indent="-457200" algn="just">
+              <a:lnSpc>
+                <a:spcPct val="150000"/>
+              </a:lnSpc>
+              <a:spcBef>
+                <a:spcPts val="0"/>
+              </a:spcBef>
+              <a:buSzPts val="2800"/>
+            </a:pPr>
+            <a:r>
+              <a:rPr lang="en-US" sz="2400" dirty="0">
+                <a:latin typeface="Agency FB Black Condensed"/>
+              </a:rPr>
+              <a:t>Assumptions/Hypotheses/Limitations</a:t>
+            </a:r>
+          </a:p>
+          <a:p>
+            <a:pPr indent="-457200" algn="just">
+              <a:lnSpc>
+                <a:spcPct val="150000"/>
+              </a:lnSpc>
+              <a:spcBef>
+                <a:spcPts val="0"/>
+              </a:spcBef>
+              <a:buSzPts val="2800"/>
+            </a:pPr>
+            <a:r>
+              <a:rPr lang="en-US" sz="2400" dirty="0">
+                <a:latin typeface="Agency FB Black Condensed"/>
+              </a:rPr>
+              <a:t>EDA</a:t>
+            </a:r>
+          </a:p>
+          <a:p>
+            <a:pPr indent="-457200" algn="just">
+              <a:lnSpc>
+                <a:spcPct val="150000"/>
+              </a:lnSpc>
+              <a:spcBef>
+                <a:spcPts val="0"/>
+              </a:spcBef>
+              <a:buSzPts val="2800"/>
+            </a:pPr>
+            <a:r>
+              <a:rPr lang="en-US" sz="2400" dirty="0">
+                <a:latin typeface="Agency FB Black Condensed"/>
+              </a:rPr>
+              <a:t>Data Properties &amp; Transformations</a:t>
+            </a:r>
+          </a:p>
+          <a:p>
+            <a:pPr indent="-457200" algn="just">
+              <a:lnSpc>
+                <a:spcPct val="150000"/>
+              </a:lnSpc>
+              <a:spcBef>
+                <a:spcPts val="0"/>
+              </a:spcBef>
+              <a:buSzPts val="2800"/>
+            </a:pPr>
+            <a:r>
+              <a:rPr lang="en-US" sz="2400" dirty="0">
+                <a:latin typeface="Agency FB Black Condensed"/>
+              </a:rPr>
+              <a:t>Proposed Approaches (# Models)</a:t>
+            </a:r>
+          </a:p>
+          <a:p>
+            <a:pPr indent="-457200" algn="just">
+              <a:lnSpc>
+                <a:spcPct val="150000"/>
+              </a:lnSpc>
+              <a:spcBef>
+                <a:spcPts val="0"/>
+              </a:spcBef>
+              <a:buSzPts val="2800"/>
+            </a:pPr>
+            <a:r>
+              <a:rPr lang="en-US" sz="2400" dirty="0">
+                <a:latin typeface="Agency FB Black Condensed"/>
+              </a:rPr>
+              <a:t>Proposed Solution (Model Selection)</a:t>
+            </a:r>
+          </a:p>
+          <a:p>
+            <a:pPr indent="-457200" algn="just">
+              <a:lnSpc>
+                <a:spcPct val="150000"/>
+              </a:lnSpc>
+              <a:spcBef>
+                <a:spcPts val="0"/>
+              </a:spcBef>
+              <a:buSzPts val="2800"/>
+            </a:pPr>
+            <a:r>
+              <a:rPr lang="en-US" sz="2400" dirty="0">
+                <a:latin typeface="Agency FB Black Condensed"/>
+              </a:rPr>
+              <a:t>Results (Accuracy, Overfitting/Underfitting)</a:t>
+            </a:r>
+          </a:p>
+          <a:p>
+            <a:pPr indent="-457200" algn="just">
+              <a:lnSpc>
+                <a:spcPct val="150000"/>
+              </a:lnSpc>
+              <a:spcBef>
+                <a:spcPts val="0"/>
+              </a:spcBef>
+              <a:buSzPts val="2800"/>
+            </a:pPr>
+            <a:r>
+              <a:rPr lang="en-US" sz="2400" dirty="0">
+                <a:latin typeface="Agency FB Black Condensed"/>
+              </a:rPr>
+              <a:t>Future Work (Model Improvement)</a:t>
+            </a:r>
+          </a:p>
+        </p:txBody>
+      </p:sp>
+    </p:spTree>
+    <p:extLst>
+      <p:ext uri="{BB962C8B-B14F-4D97-AF65-F5344CB8AC3E}">
+        <p14:creationId xmlns:p14="http://schemas.microsoft.com/office/powerpoint/2010/main" val="313531919"/>
+      </p:ext>
+    </p:extLst>
+  </p:cSld>
+  <p:clrMapOvr>
+    <a:masterClrMapping/>
+  </p:clrMapOvr>
+</p:sld>
+</file>
+
+<file path=ppt/slides/slide20.xml><?xml version="1.0" encoding="utf-8"?>
 <p:sld xmlns:a="http://schemas.openxmlformats.org/drawingml/2006/main" xmlns:r="http://schemas.openxmlformats.org/officeDocument/2006/relationships" xmlns:p="http://schemas.openxmlformats.org/presentationml/2006/main">
   <p:cSld>
     <p:spTree>
@@ -18194,7 +19672,7 @@
 </p:sld>
 </file>
 
-<file path=ppt/slides/slide19.xml><?xml version="1.0" encoding="utf-8"?>
+<file path=ppt/slides/slide21.xml><?xml version="1.0" encoding="utf-8"?>
 <p:sld xmlns:a="http://schemas.openxmlformats.org/drawingml/2006/main" xmlns:r="http://schemas.openxmlformats.org/officeDocument/2006/relationships" xmlns:p="http://schemas.openxmlformats.org/presentationml/2006/main">
   <p:cSld>
     <p:spTree>
@@ -18329,263 +19807,6 @@
         </p:txBody>
       </p:sp>
     </p:spTree>
-  </p:cSld>
-  <p:clrMapOvr>
-    <a:masterClrMapping/>
-  </p:clrMapOvr>
-</p:sld>
-</file>
-
-<file path=ppt/slides/slide2.xml><?xml version="1.0" encoding="utf-8"?>
-<p:sld xmlns:a="http://schemas.openxmlformats.org/drawingml/2006/main" xmlns:r="http://schemas.openxmlformats.org/officeDocument/2006/relationships" xmlns:p="http://schemas.openxmlformats.org/presentationml/2006/main">
-  <p:cSld>
-    <p:spTree>
-      <p:nvGrpSpPr>
-        <p:cNvPr id="1" name="Shape 117"/>
-        <p:cNvGrpSpPr/>
-        <p:nvPr/>
-      </p:nvGrpSpPr>
-      <p:grpSpPr>
-        <a:xfrm>
-          <a:off x="0" y="0"/>
-          <a:ext cx="0" cy="0"/>
-          <a:chOff x="0" y="0"/>
-          <a:chExt cx="0" cy="0"/>
-        </a:xfrm>
-      </p:grpSpPr>
-      <p:sp>
-        <p:nvSpPr>
-          <p:cNvPr id="118" name="Google Shape;118;p4"/>
-          <p:cNvSpPr txBox="1">
-            <a:spLocks noGrp="1"/>
-          </p:cNvSpPr>
-          <p:nvPr>
-            <p:ph type="title"/>
-          </p:nvPr>
-        </p:nvSpPr>
-        <p:spPr>
-          <a:xfrm>
-            <a:off x="838200" y="365125"/>
-            <a:ext cx="10515600" cy="1325563"/>
-          </a:xfrm>
-          <a:prstGeom prst="rect">
-            <a:avLst/>
-          </a:prstGeom>
-          <a:noFill/>
-          <a:ln>
-            <a:noFill/>
-          </a:ln>
-        </p:spPr>
-        <p:txBody>
-          <a:bodyPr spcFirstLastPara="1" wrap="square" lIns="91425" tIns="45700" rIns="91425" bIns="45700" anchor="ctr" anchorCtr="0">
-            <a:normAutofit/>
-          </a:bodyPr>
-          <a:lstStyle/>
-          <a:p>
-            <a:pPr marL="0" lvl="0" indent="0" algn="l" rtl="0">
-              <a:lnSpc>
-                <a:spcPct val="90000"/>
-              </a:lnSpc>
-              <a:spcBef>
-                <a:spcPts val="0"/>
-              </a:spcBef>
-              <a:spcAft>
-                <a:spcPts val="0"/>
-              </a:spcAft>
-              <a:buClr>
-                <a:schemeClr val="dk1"/>
-              </a:buClr>
-              <a:buSzPts val="4400"/>
-              <a:buFont typeface="Garamond"/>
-              <a:buNone/>
-            </a:pPr>
-            <a:r>
-              <a:rPr lang="en-US" b="1" dirty="0">
-                <a:latin typeface="Agency FB Black Condensed"/>
-                <a:ea typeface="Garamond"/>
-                <a:cs typeface="Garamond"/>
-                <a:sym typeface="Garamond"/>
-              </a:rPr>
-              <a:t>Agenda</a:t>
-            </a:r>
-            <a:endParaRPr dirty="0">
-              <a:latin typeface="Agency FB Black Condensed"/>
-            </a:endParaRPr>
-          </a:p>
-        </p:txBody>
-      </p:sp>
-      <p:sp>
-        <p:nvSpPr>
-          <p:cNvPr id="119" name="Google Shape;119;p4"/>
-          <p:cNvSpPr txBox="1">
-            <a:spLocks noGrp="1"/>
-          </p:cNvSpPr>
-          <p:nvPr>
-            <p:ph type="body" idx="1"/>
-          </p:nvPr>
-        </p:nvSpPr>
-        <p:spPr>
-          <a:xfrm>
-            <a:off x="838200" y="1828801"/>
-            <a:ext cx="10317480" cy="3908868"/>
-          </a:xfrm>
-          <a:prstGeom prst="rect">
-            <a:avLst/>
-          </a:prstGeom>
-          <a:noFill/>
-          <a:ln>
-            <a:noFill/>
-          </a:ln>
-        </p:spPr>
-        <p:txBody>
-          <a:bodyPr spcFirstLastPara="1" wrap="square" lIns="91425" tIns="45700" rIns="91425" bIns="45700" anchor="t" anchorCtr="0">
-            <a:noAutofit/>
-          </a:bodyPr>
-          <a:lstStyle/>
-          <a:p>
-            <a:pPr indent="-457200" algn="just">
-              <a:lnSpc>
-                <a:spcPct val="150000"/>
-              </a:lnSpc>
-              <a:spcBef>
-                <a:spcPts val="0"/>
-              </a:spcBef>
-              <a:buSzPts val="2800"/>
-            </a:pPr>
-            <a:r>
-              <a:rPr lang="en-US" sz="2400" b="1" dirty="0">
-                <a:latin typeface="Agency FB Black Condensed"/>
-              </a:rPr>
-              <a:t>Background/Problem Statement</a:t>
-            </a:r>
-          </a:p>
-          <a:p>
-            <a:pPr indent="-457200" algn="just">
-              <a:lnSpc>
-                <a:spcPct val="150000"/>
-              </a:lnSpc>
-              <a:spcBef>
-                <a:spcPts val="0"/>
-              </a:spcBef>
-              <a:buSzPts val="2800"/>
-            </a:pPr>
-            <a:r>
-              <a:rPr lang="en-US" sz="2400" b="1" dirty="0">
-                <a:latin typeface="Agency FB Black Condensed"/>
-              </a:rPr>
-              <a:t>Assumptions/Hypotheses/Limitations</a:t>
-            </a:r>
-          </a:p>
-          <a:p>
-            <a:pPr indent="-457200" algn="just">
-              <a:lnSpc>
-                <a:spcPct val="150000"/>
-              </a:lnSpc>
-              <a:spcBef>
-                <a:spcPts val="0"/>
-              </a:spcBef>
-              <a:buSzPts val="2800"/>
-            </a:pPr>
-            <a:r>
-              <a:rPr lang="en-US" sz="2400" b="1" dirty="0">
-                <a:latin typeface="Agency FB Black Condensed"/>
-              </a:rPr>
-              <a:t>EDA</a:t>
-            </a:r>
-          </a:p>
-          <a:p>
-            <a:pPr indent="-457200" algn="just">
-              <a:lnSpc>
-                <a:spcPct val="150000"/>
-              </a:lnSpc>
-              <a:spcBef>
-                <a:spcPts val="0"/>
-              </a:spcBef>
-              <a:buSzPts val="2800"/>
-            </a:pPr>
-            <a:r>
-              <a:rPr lang="en-US" sz="2400" b="1" dirty="0">
-                <a:latin typeface="Agency FB Black Condensed"/>
-              </a:rPr>
-              <a:t>Data Properties &amp; Transformations</a:t>
-            </a:r>
-          </a:p>
-          <a:p>
-            <a:pPr indent="-457200" algn="just">
-              <a:lnSpc>
-                <a:spcPct val="150000"/>
-              </a:lnSpc>
-              <a:spcBef>
-                <a:spcPts val="0"/>
-              </a:spcBef>
-              <a:buSzPts val="2800"/>
-            </a:pPr>
-            <a:r>
-              <a:rPr lang="en-US" sz="2400" b="1" dirty="0">
-                <a:latin typeface="Agency FB Black Condensed"/>
-              </a:rPr>
-              <a:t>Proposed Approaches (# Models)</a:t>
-            </a:r>
-          </a:p>
-          <a:p>
-            <a:pPr indent="-457200" algn="just">
-              <a:lnSpc>
-                <a:spcPct val="150000"/>
-              </a:lnSpc>
-              <a:spcBef>
-                <a:spcPts val="0"/>
-              </a:spcBef>
-              <a:buSzPts val="2800"/>
-            </a:pPr>
-            <a:r>
-              <a:rPr lang="en-US" sz="2400" b="1" dirty="0">
-                <a:latin typeface="Agency FB Black Condensed"/>
-              </a:rPr>
-              <a:t>Proposed Solution (Model Selection)</a:t>
-            </a:r>
-          </a:p>
-          <a:p>
-            <a:pPr indent="-457200" algn="just">
-              <a:lnSpc>
-                <a:spcPct val="150000"/>
-              </a:lnSpc>
-              <a:spcBef>
-                <a:spcPts val="0"/>
-              </a:spcBef>
-              <a:buSzPts val="2800"/>
-            </a:pPr>
-            <a:r>
-              <a:rPr lang="en-US" sz="2400" b="1" dirty="0">
-                <a:latin typeface="Agency FB Black Condensed"/>
-              </a:rPr>
-              <a:t>Results (Accuracy, Overfitting/Underfitting)</a:t>
-            </a:r>
-          </a:p>
-          <a:p>
-            <a:pPr indent="-457200" algn="just">
-              <a:lnSpc>
-                <a:spcPct val="150000"/>
-              </a:lnSpc>
-              <a:spcBef>
-                <a:spcPts val="0"/>
-              </a:spcBef>
-              <a:buSzPts val="2800"/>
-            </a:pPr>
-            <a:r>
-              <a:rPr lang="en-US" sz="2400" b="1" dirty="0">
-                <a:latin typeface="Agency FB Black Condensed"/>
-              </a:rPr>
-              <a:t>Future Work (Model Improvement)</a:t>
-            </a:r>
-          </a:p>
-        </p:txBody>
-      </p:sp>
-    </p:spTree>
-    <p:extLst>
-      <p:ext uri="{BB962C8B-B14F-4D97-AF65-F5344CB8AC3E}">
-        <p14:creationId xmlns:p14="http://schemas.microsoft.com/office/powerpoint/2010/main" val="313531919"/>
-      </p:ext>
-    </p:extLst>
   </p:cSld>
   <p:clrMapOvr>
     <a:masterClrMapping/>
@@ -19252,7 +20473,7 @@
           <a:graphicData uri="http://schemas.openxmlformats.org/presentationml/2006/ole">
             <mc:AlternateContent xmlns:mc="http://schemas.openxmlformats.org/markup-compatibility/2006">
               <mc:Choice xmlns:v="urn:schemas-microsoft-com:vml" Requires="v">
-                <p:oleObj spid="_x0000_s1029" name="Worksheet" r:id="rId4" imgW="2552598" imgH="961992" progId="Excel.Sheet.12">
+                <p:oleObj spid="_x0000_s1030" name="Worksheet" r:id="rId4" imgW="2552598" imgH="961992" progId="Excel.Sheet.12">
                   <p:embed/>
                 </p:oleObj>
               </mc:Choice>
@@ -19412,7 +20633,7 @@
                 <a:cs typeface="Garamond"/>
                 <a:sym typeface="Garamond"/>
               </a:rPr>
-              <a:t>Data description</a:t>
+              <a:t>Data Preparation</a:t>
             </a:r>
             <a:endParaRPr dirty="0">
               <a:latin typeface="Agency FB Black Condensed"/>
@@ -19461,97 +20682,11 @@
               <a:buChar char="•"/>
             </a:pPr>
             <a:r>
-              <a:rPr lang="en-US" sz="2400" b="1" dirty="0">
-                <a:latin typeface="Agency FB Black Condensed"/>
-              </a:rPr>
-              <a:t>Sources: </a:t>
-            </a:r>
-            <a:r>
-              <a:rPr lang="en-US" sz="2400" dirty="0"/>
-              <a:t>Retrosheet.org</a:t>
-            </a:r>
-            <a:endParaRPr lang="en-US" sz="2400" b="1" dirty="0">
-              <a:latin typeface="Agency FB Black Condensed"/>
-            </a:endParaRPr>
-          </a:p>
-          <a:p>
-            <a:pPr marL="342900" algn="just">
-              <a:lnSpc>
-                <a:spcPct val="150000"/>
-              </a:lnSpc>
-              <a:spcBef>
-                <a:spcPts val="0"/>
-              </a:spcBef>
-              <a:buSzPts val="2800"/>
-              <a:buFont typeface="Arial" panose="020B0604020202020204" pitchFamily="34" charset="0"/>
-              <a:buChar char="•"/>
-            </a:pPr>
-            <a:r>
-              <a:rPr lang="en-US" sz="2400" b="1" dirty="0">
-                <a:latin typeface="Agency FB Black Condensed"/>
-              </a:rPr>
-              <a:t>Size: </a:t>
-            </a:r>
-          </a:p>
-          <a:p>
-            <a:pPr marL="342900" algn="just">
-              <a:lnSpc>
-                <a:spcPct val="150000"/>
-              </a:lnSpc>
-              <a:spcBef>
-                <a:spcPts val="0"/>
-              </a:spcBef>
-              <a:buSzPts val="2800"/>
-              <a:buFont typeface="Arial" panose="020B0604020202020204" pitchFamily="34" charset="0"/>
-              <a:buChar char="•"/>
-            </a:pPr>
-            <a:r>
-              <a:rPr lang="en-US" sz="2400" b="1" dirty="0">
-                <a:latin typeface="Agency FB Black Condensed"/>
-              </a:rPr>
-              <a:t>Quality: </a:t>
-            </a:r>
-            <a:r>
               <a:rPr lang="en-US" sz="2400" dirty="0">
                 <a:latin typeface="Agency FB Black Condensed"/>
               </a:rPr>
-              <a:t>no missing values</a:t>
+              <a:t>We need Mike here to go through the whole process of data prep</a:t>
             </a:r>
-          </a:p>
-          <a:p>
-            <a:pPr marL="342900" algn="just">
-              <a:lnSpc>
-                <a:spcPct val="150000"/>
-              </a:lnSpc>
-              <a:spcBef>
-                <a:spcPts val="0"/>
-              </a:spcBef>
-              <a:buSzPts val="2800"/>
-              <a:buFont typeface="Arial" panose="020B0604020202020204" pitchFamily="34" charset="0"/>
-              <a:buChar char="•"/>
-            </a:pPr>
-            <a:r>
-              <a:rPr lang="en-US" sz="2400" b="1" dirty="0">
-                <a:latin typeface="Agency FB Black Condensed"/>
-              </a:rPr>
-              <a:t>Else:</a:t>
-            </a:r>
-          </a:p>
-          <a:p>
-            <a:pPr marL="342900" algn="just">
-              <a:lnSpc>
-                <a:spcPct val="150000"/>
-              </a:lnSpc>
-              <a:spcBef>
-                <a:spcPts val="0"/>
-              </a:spcBef>
-              <a:buSzPts val="2800"/>
-              <a:buFont typeface="Arial" panose="020B0604020202020204" pitchFamily="34" charset="0"/>
-              <a:buChar char="•"/>
-            </a:pPr>
-            <a:endParaRPr lang="en-US" sz="2400" dirty="0">
-              <a:latin typeface="Agency FB Black Condensed"/>
-            </a:endParaRPr>
           </a:p>
           <a:p>
             <a:pPr marL="342900" algn="just">
@@ -19632,7 +20767,7 @@
     </p:spTree>
     <p:extLst>
       <p:ext uri="{BB962C8B-B14F-4D97-AF65-F5344CB8AC3E}">
-        <p14:creationId xmlns:p14="http://schemas.microsoft.com/office/powerpoint/2010/main" val="3123803122"/>
+        <p14:creationId xmlns:p14="http://schemas.microsoft.com/office/powerpoint/2010/main" val="1942574116"/>
       </p:ext>
     </p:extLst>
   </p:cSld>
@@ -19708,9 +20843,11 @@
             <a:r>
               <a:rPr lang="en-US" b="1" dirty="0">
                 <a:latin typeface="Agency FB Black Condensed"/>
+                <a:ea typeface="Garamond"/>
+                <a:cs typeface="Garamond"/>
                 <a:sym typeface="Garamond"/>
               </a:rPr>
-              <a:t>Exploratory Data Analysis</a:t>
+              <a:t>Data description (initial, updated, final)</a:t>
             </a:r>
             <a:endParaRPr dirty="0">
               <a:latin typeface="Agency FB Black Condensed"/>
@@ -19762,7 +20899,58 @@
               <a:rPr lang="en-US" sz="2400" b="1" dirty="0">
                 <a:latin typeface="Agency FB Black Condensed"/>
               </a:rPr>
-              <a:t>Skewed distribution of a target variable</a:t>
+              <a:t>Sources: </a:t>
+            </a:r>
+            <a:r>
+              <a:rPr lang="en-US" sz="2400" dirty="0"/>
+              <a:t>Retrosheet.org</a:t>
+            </a:r>
+            <a:endParaRPr lang="en-US" sz="2400" b="1" dirty="0">
+              <a:latin typeface="Agency FB Black Condensed"/>
+            </a:endParaRPr>
+          </a:p>
+          <a:p>
+            <a:pPr marL="342900" algn="just">
+              <a:lnSpc>
+                <a:spcPct val="150000"/>
+              </a:lnSpc>
+              <a:spcBef>
+                <a:spcPts val="0"/>
+              </a:spcBef>
+              <a:buSzPts val="2800"/>
+              <a:buFont typeface="Arial" panose="020B0604020202020204" pitchFamily="34" charset="0"/>
+              <a:buChar char="•"/>
+            </a:pPr>
+            <a:r>
+              <a:rPr lang="en-US" sz="2400" b="1" dirty="0">
+                <a:latin typeface="Agency FB Black Condensed"/>
+              </a:rPr>
+              <a:t>Size: </a:t>
+            </a:r>
+          </a:p>
+          <a:p>
+            <a:pPr marL="342900" algn="just">
+              <a:lnSpc>
+                <a:spcPct val="150000"/>
+              </a:lnSpc>
+              <a:spcBef>
+                <a:spcPts val="0"/>
+              </a:spcBef>
+              <a:buSzPts val="2800"/>
+              <a:buFont typeface="Arial" panose="020B0604020202020204" pitchFamily="34" charset="0"/>
+              <a:buChar char="•"/>
+            </a:pPr>
+            <a:r>
+              <a:rPr lang="en-US" sz="2400" b="1" dirty="0">
+                <a:latin typeface="Agency FB Black Condensed"/>
+              </a:rPr>
+              <a:t>Quality: </a:t>
+            </a:r>
+            <a:r>
+              <a:rPr lang="en-US" sz="2400" dirty="0">
+                <a:latin typeface="Agency FB Black Condensed"/>
+              </a:rPr>
+              <a:t>no missing values</a:t>
             </a:r>
           </a:p>
           <a:p>
@@ -19796,7 +20984,39 @@
               <a:buFont typeface="Arial" panose="020B0604020202020204" pitchFamily="34" charset="0"/>
               <a:buChar char="•"/>
             </a:pPr>
-            <a:endParaRPr lang="en-US" sz="2400" b="1" dirty="0">
+            <a:endParaRPr lang="en-US" sz="2400" dirty="0">
+              <a:latin typeface="Agency FB Black Condensed"/>
+            </a:endParaRPr>
+          </a:p>
+          <a:p>
+            <a:pPr marL="342900" algn="just">
+              <a:lnSpc>
+                <a:spcPct val="150000"/>
+              </a:lnSpc>
+              <a:spcBef>
+                <a:spcPts val="0"/>
+              </a:spcBef>
+              <a:buSzPts val="2800"/>
+              <a:buFont typeface="Arial" panose="020B0604020202020204" pitchFamily="34" charset="0"/>
+              <a:buChar char="•"/>
+            </a:pPr>
+            <a:endParaRPr lang="en-US" dirty="0">
+              <a:latin typeface="Agency FB Black Condensed"/>
+            </a:endParaRPr>
+          </a:p>
+          <a:p>
+            <a:pPr marL="800100" lvl="1" algn="just">
+              <a:lnSpc>
+                <a:spcPct val="100000"/>
+              </a:lnSpc>
+              <a:spcBef>
+                <a:spcPts val="0"/>
+              </a:spcBef>
+              <a:buSzPts val="2800"/>
+              <a:buFont typeface="Arial" panose="020B0604020202020204" pitchFamily="34" charset="0"/>
+              <a:buChar char="•"/>
+            </a:pPr>
+            <a:endParaRPr lang="en-US" sz="2000" dirty="0">
               <a:latin typeface="Agency FB Black Condensed"/>
             </a:endParaRPr>
           </a:p>
@@ -19847,7 +21067,7 @@
     </p:spTree>
     <p:extLst>
       <p:ext uri="{BB962C8B-B14F-4D97-AF65-F5344CB8AC3E}">
-        <p14:creationId xmlns:p14="http://schemas.microsoft.com/office/powerpoint/2010/main" val="1021131731"/>
+        <p14:creationId xmlns:p14="http://schemas.microsoft.com/office/powerpoint/2010/main" val="3123803122"/>
       </p:ext>
     </p:extLst>
   </p:cSld>
@@ -19923,11 +21143,9 @@
             <a:r>
               <a:rPr lang="en-US" b="1" dirty="0">
                 <a:latin typeface="Agency FB Black Condensed"/>
-                <a:ea typeface="Garamond"/>
-                <a:cs typeface="Garamond"/>
                 <a:sym typeface="Garamond"/>
               </a:rPr>
-              <a:t>Feature engineering</a:t>
+              <a:t>Exploratory Data Analysis</a:t>
             </a:r>
             <a:endParaRPr dirty="0">
               <a:latin typeface="Agency FB Black Condensed"/>
@@ -19979,7 +21197,7 @@
               <a:rPr lang="en-US" sz="2400" b="1" dirty="0">
                 <a:latin typeface="Agency FB Black Condensed"/>
               </a:rPr>
-              <a:t>Total variables: </a:t>
+              <a:t>Skewed distribution of a target variable</a:t>
             </a:r>
           </a:p>
           <a:p>
@@ -19998,47 +21216,15 @@
               <a:rPr lang="en-US" sz="2400" b="1" dirty="0">
                 <a:latin typeface="Agency FB Black Condensed"/>
               </a:rPr>
-              <a:t>Numeric and some categorical</a:t>
+              <a:t>No </a:t>
             </a:r>
-          </a:p>
-          <a:p>
-            <a:pPr marL="342900" algn="just">
-              <a:lnSpc>
-                <a:spcPct val="150000"/>
-              </a:lnSpc>
-              <a:spcBef>
-                <a:spcPts val="0"/>
-              </a:spcBef>
-              <a:buSzPts val="2800"/>
-              <a:buFont typeface="Arial" panose="020B0604020202020204" pitchFamily="34" charset="0"/>
-              <a:buChar char="•"/>
-            </a:pPr>
             <a:r>
-              <a:rPr lang="en-US" sz="2400" b="1" dirty="0">
+              <a:rPr lang="en-US" sz="2400" b="1" dirty="0" err="1">
                 <a:latin typeface="Agency FB Black Condensed"/>
               </a:rPr>
-              <a:t>Problem: </a:t>
+              <a:t>StandardScaler</a:t>
             </a:r>
-            <a:r>
-              <a:rPr lang="en-US" sz="2400" dirty="0">
-                <a:latin typeface="Agency FB Black Condensed"/>
-              </a:rPr>
-              <a:t>high collinearity between multiple variables</a:t>
-            </a:r>
-          </a:p>
-          <a:p>
-            <a:pPr marL="342900" algn="just">
-              <a:lnSpc>
-                <a:spcPct val="150000"/>
-              </a:lnSpc>
-              <a:spcBef>
-                <a:spcPts val="0"/>
-              </a:spcBef>
-              <a:buSzPts val="2800"/>
-              <a:buFont typeface="Arial" panose="020B0604020202020204" pitchFamily="34" charset="0"/>
-              <a:buChar char="•"/>
-            </a:pPr>
-            <a:endParaRPr lang="en-US" sz="2400" dirty="0">
+            <a:endParaRPr lang="en-US" sz="2400" b="1" dirty="0">
               <a:latin typeface="Agency FB Black Condensed"/>
             </a:endParaRPr>
           </a:p>
@@ -20054,14 +21240,14 @@
               <a:buFont typeface="Arial" panose="020B0604020202020204" pitchFamily="34" charset="0"/>
               <a:buChar char="•"/>
             </a:pPr>
-            <a:endParaRPr lang="en-US" dirty="0">
+            <a:endParaRPr lang="en-US" sz="2400" b="1" dirty="0">
               <a:latin typeface="Agency FB Black Condensed"/>
             </a:endParaRPr>
           </a:p>
           <a:p>
-            <a:pPr marL="800100" lvl="1" algn="just">
-              <a:lnSpc>
-                <a:spcPct val="100000"/>
+            <a:pPr marL="342900" algn="just">
+              <a:lnSpc>
+                <a:spcPct val="150000"/>
               </a:lnSpc>
               <a:spcBef>
                 <a:spcPts val="0"/>
@@ -20070,7 +21256,7 @@
               <a:buFont typeface="Arial" panose="020B0604020202020204" pitchFamily="34" charset="0"/>
               <a:buChar char="•"/>
             </a:pPr>
-            <a:endParaRPr lang="en-US" sz="2000" dirty="0">
+            <a:endParaRPr lang="en-US" sz="2400" b="1" dirty="0">
               <a:latin typeface="Agency FB Black Condensed"/>
             </a:endParaRPr>
           </a:p>
@@ -20121,7 +21307,7 @@
     </p:spTree>
     <p:extLst>
       <p:ext uri="{BB962C8B-B14F-4D97-AF65-F5344CB8AC3E}">
-        <p14:creationId xmlns:p14="http://schemas.microsoft.com/office/powerpoint/2010/main" val="4260268088"/>
+        <p14:creationId xmlns:p14="http://schemas.microsoft.com/office/powerpoint/2010/main" val="1021131731"/>
       </p:ext>
     </p:extLst>
   </p:cSld>
@@ -20201,16 +21387,7 @@
                 <a:cs typeface="Garamond"/>
                 <a:sym typeface="Garamond"/>
               </a:rPr>
-              <a:t>Model EDA with </a:t>
-            </a:r>
-            <a:r>
-              <a:rPr lang="en-US" b="1" dirty="0" err="1">
-                <a:latin typeface="Agency FB Black Condensed"/>
-                <a:ea typeface="Garamond"/>
-                <a:cs typeface="Garamond"/>
-                <a:sym typeface="Garamond"/>
-              </a:rPr>
-              <a:t>PyCaret</a:t>
+              <a:t>Feature engineering</a:t>
             </a:r>
             <a:endParaRPr dirty="0">
               <a:latin typeface="Agency FB Black Condensed"/>
@@ -20262,64 +21439,7 @@
               <a:rPr lang="en-US" sz="2400" b="1" dirty="0">
                 <a:latin typeface="Agency FB Black Condensed"/>
               </a:rPr>
-              <a:t>Advantages: </a:t>
-            </a:r>
-          </a:p>
-          <a:p>
-            <a:pPr marL="800100" lvl="1" algn="just">
-              <a:lnSpc>
-                <a:spcPct val="150000"/>
-              </a:lnSpc>
-              <a:spcBef>
-                <a:spcPts val="0"/>
-              </a:spcBef>
-              <a:buSzPts val="2800"/>
-              <a:buFont typeface="Arial" panose="020B0604020202020204" pitchFamily="34" charset="0"/>
-              <a:buChar char="•"/>
-            </a:pPr>
-            <a:r>
-              <a:rPr lang="en-US" dirty="0">
-                <a:latin typeface="Agency FB Black Condensed"/>
-              </a:rPr>
-              <a:t>Low code Python library</a:t>
-            </a:r>
-          </a:p>
-          <a:p>
-            <a:pPr marL="800100" lvl="1" algn="just">
-              <a:lnSpc>
-                <a:spcPct val="150000"/>
-              </a:lnSpc>
-              <a:spcBef>
-                <a:spcPts val="0"/>
-              </a:spcBef>
-              <a:buSzPts val="2800"/>
-              <a:buFont typeface="Arial" panose="020B0604020202020204" pitchFamily="34" charset="0"/>
-              <a:buChar char="•"/>
-            </a:pPr>
-            <a:r>
-              <a:rPr lang="en-US" dirty="0">
-                <a:latin typeface="Agency FB Black Condensed"/>
-              </a:rPr>
-              <a:t>High level overview of regression models and their results </a:t>
-            </a:r>
-          </a:p>
-          <a:p>
-            <a:pPr marL="800100" lvl="1" algn="just">
-              <a:lnSpc>
-                <a:spcPct val="150000"/>
-              </a:lnSpc>
-              <a:spcBef>
-                <a:spcPts val="0"/>
-              </a:spcBef>
-              <a:buSzPts val="2800"/>
-              <a:buFont typeface="Arial" panose="020B0604020202020204" pitchFamily="34" charset="0"/>
-              <a:buChar char="•"/>
-            </a:pPr>
-            <a:r>
-              <a:rPr lang="en-US" dirty="0">
-                <a:latin typeface="Agency FB Black Condensed"/>
-              </a:rPr>
-              <a:t>Ideas for exploration (accuracy vs time)</a:t>
+              <a:t>Total variables: </a:t>
             </a:r>
           </a:p>
           <a:p>
@@ -20338,11 +21458,11 @@
               <a:rPr lang="en-US" sz="2400" b="1" dirty="0">
                 <a:latin typeface="Agency FB Black Condensed"/>
               </a:rPr>
-              <a:t>Disadvantages:</a:t>
+              <a:t>Numeric and some categorical</a:t>
             </a:r>
           </a:p>
           <a:p>
-            <a:pPr marL="800100" lvl="1" algn="just">
+            <a:pPr marL="342900" algn="just">
               <a:lnSpc>
                 <a:spcPct val="150000"/>
               </a:lnSpc>
@@ -20354,155 +21474,17 @@
               <a:buChar char="•"/>
             </a:pPr>
             <a:r>
-              <a:rPr lang="en-US" dirty="0">
+              <a:rPr lang="en-US" sz="2400" b="1" dirty="0">
                 <a:latin typeface="Agency FB Black Condensed"/>
               </a:rPr>
-              <a:t>Blackbox solution</a:t>
+              <a:t>Problem: </a:t>
             </a:r>
-          </a:p>
-          <a:p>
-            <a:pPr marL="800100" lvl="1" algn="just">
-              <a:lnSpc>
-                <a:spcPct val="150000"/>
-              </a:lnSpc>
-              <a:spcBef>
-                <a:spcPts val="0"/>
-              </a:spcBef>
-              <a:buSzPts val="2800"/>
-              <a:buFont typeface="Arial" panose="020B0604020202020204" pitchFamily="34" charset="0"/>
-              <a:buChar char="•"/>
-            </a:pPr>
-            <a:endParaRPr lang="en-US" dirty="0">
-              <a:latin typeface="Agency FB Black Condensed"/>
-            </a:endParaRPr>
-          </a:p>
-          <a:p>
-            <a:pPr marL="800100" lvl="1" algn="just">
-              <a:lnSpc>
-                <a:spcPct val="150000"/>
-              </a:lnSpc>
-              <a:spcBef>
-                <a:spcPts val="0"/>
-              </a:spcBef>
-              <a:buSzPts val="2800"/>
-              <a:buFont typeface="Arial" panose="020B0604020202020204" pitchFamily="34" charset="0"/>
-              <a:buChar char="•"/>
-            </a:pPr>
-            <a:endParaRPr lang="en-US" sz="2000" dirty="0">
-              <a:latin typeface="Agency FB Black Condensed"/>
-            </a:endParaRPr>
-          </a:p>
-          <a:p>
-            <a:pPr marL="800100" lvl="1" algn="just">
-              <a:lnSpc>
-                <a:spcPct val="150000"/>
-              </a:lnSpc>
-              <a:spcBef>
-                <a:spcPts val="0"/>
-              </a:spcBef>
-              <a:buSzPts val="2800"/>
-              <a:buFont typeface="Arial" panose="020B0604020202020204" pitchFamily="34" charset="0"/>
-              <a:buChar char="•"/>
-            </a:pPr>
-            <a:endParaRPr lang="en-US" sz="2000" dirty="0">
-              <a:latin typeface="Agency FB Black Condensed"/>
-            </a:endParaRPr>
-          </a:p>
-          <a:p>
-            <a:pPr marL="800100" lvl="1" algn="just">
-              <a:lnSpc>
-                <a:spcPct val="150000"/>
-              </a:lnSpc>
-              <a:spcBef>
-                <a:spcPts val="0"/>
-              </a:spcBef>
-              <a:buSzPts val="2800"/>
-              <a:buFont typeface="Arial" panose="020B0604020202020204" pitchFamily="34" charset="0"/>
-              <a:buChar char="•"/>
-            </a:pPr>
-            <a:endParaRPr lang="en-US" sz="2000" dirty="0">
-              <a:latin typeface="Agency FB Black Condensed"/>
-            </a:endParaRPr>
-          </a:p>
-          <a:p>
-            <a:pPr marL="800100" lvl="1" algn="just">
-              <a:lnSpc>
-                <a:spcPct val="150000"/>
-              </a:lnSpc>
-              <a:spcBef>
-                <a:spcPts val="0"/>
-              </a:spcBef>
-              <a:buSzPts val="2800"/>
-              <a:buFont typeface="Arial" panose="020B0604020202020204" pitchFamily="34" charset="0"/>
-              <a:buChar char="•"/>
-            </a:pPr>
-            <a:endParaRPr lang="en-US" sz="2000" dirty="0">
-              <a:latin typeface="Agency FB Black Condensed"/>
-            </a:endParaRPr>
-          </a:p>
-          <a:p>
-            <a:pPr marL="800100" lvl="1" algn="just">
-              <a:lnSpc>
-                <a:spcPct val="150000"/>
-              </a:lnSpc>
-              <a:spcBef>
-                <a:spcPts val="0"/>
-              </a:spcBef>
-              <a:buSzPts val="2800"/>
-              <a:buFont typeface="Arial" panose="020B0604020202020204" pitchFamily="34" charset="0"/>
-              <a:buChar char="•"/>
-            </a:pPr>
-            <a:endParaRPr lang="en-US" sz="2000" dirty="0">
-              <a:latin typeface="Agency FB Black Condensed"/>
-            </a:endParaRPr>
-          </a:p>
-          <a:p>
-            <a:pPr marL="800100" lvl="1" algn="just">
-              <a:lnSpc>
-                <a:spcPct val="150000"/>
-              </a:lnSpc>
-              <a:spcBef>
-                <a:spcPts val="0"/>
-              </a:spcBef>
-              <a:buSzPts val="2800"/>
-              <a:buFont typeface="Arial" panose="020B0604020202020204" pitchFamily="34" charset="0"/>
-              <a:buChar char="•"/>
-            </a:pPr>
-            <a:endParaRPr lang="en-US" sz="2000" dirty="0">
-              <a:latin typeface="Agency FB Black Condensed"/>
-            </a:endParaRPr>
-          </a:p>
-          <a:p>
-            <a:pPr marL="800100" lvl="1" algn="just">
-              <a:lnSpc>
-                <a:spcPct val="150000"/>
-              </a:lnSpc>
-              <a:spcBef>
-                <a:spcPts val="0"/>
-              </a:spcBef>
-              <a:buSzPts val="2800"/>
-              <a:buFont typeface="Arial" panose="020B0604020202020204" pitchFamily="34" charset="0"/>
-              <a:buChar char="•"/>
-            </a:pPr>
-            <a:endParaRPr lang="en-US" sz="2000" dirty="0">
-              <a:latin typeface="Agency FB Black Condensed"/>
-            </a:endParaRPr>
-          </a:p>
-          <a:p>
-            <a:pPr marL="800100" lvl="1" algn="just">
-              <a:lnSpc>
-                <a:spcPct val="150000"/>
-              </a:lnSpc>
-              <a:spcBef>
-                <a:spcPts val="0"/>
-              </a:spcBef>
-              <a:buSzPts val="2800"/>
-              <a:buFont typeface="Arial" panose="020B0604020202020204" pitchFamily="34" charset="0"/>
-              <a:buChar char="•"/>
-            </a:pPr>
-            <a:endParaRPr lang="en-US" sz="2000" dirty="0">
-              <a:latin typeface="Agency FB Black Condensed"/>
-            </a:endParaRPr>
+            <a:r>
+              <a:rPr lang="en-US" sz="2400" dirty="0">
+                <a:latin typeface="Agency FB Black Condensed"/>
+              </a:rPr>
+              <a:t>high collinearity between multiple variables</a:t>
+            </a:r>
           </a:p>
           <a:p>
             <a:pPr marL="342900" algn="just">
@@ -20599,7 +21581,7 @@
     </p:spTree>
     <p:extLst>
       <p:ext uri="{BB962C8B-B14F-4D97-AF65-F5344CB8AC3E}">
-        <p14:creationId xmlns:p14="http://schemas.microsoft.com/office/powerpoint/2010/main" val="1521044736"/>
+        <p14:creationId xmlns:p14="http://schemas.microsoft.com/office/powerpoint/2010/main" val="4260268088"/>
       </p:ext>
     </p:extLst>
   </p:cSld>

</xml_diff>